<commit_message>
done with the concepts
</commit_message>
<xml_diff>
--- a/figures/Figures-Yi.pptx
+++ b/figures/Figures-Yi.pptx
@@ -18772,7 +18772,7 @@
         </p:nvSpPr>
         <p:spPr>
           <a:xfrm>
-            <a:off x="1252917" y="297180"/>
+            <a:off x="1135890" y="290530"/>
             <a:ext cx="3646551" cy="1396958"/>
           </a:xfrm>
           <a:prstGeom prst="rect">
@@ -19606,9 +19606,10 @@
           <a:lstStyle/>
           <a:p>
             <a:r>
-              <a:rPr lang="en-US" sz="1400" dirty="0"/>
+              <a:rPr lang="en-US" sz="1400" dirty="0" err="1"/>
               <a:t>i</a:t>
             </a:r>
+            <a:endParaRPr lang="en-US" sz="1400" dirty="0"/>
           </a:p>
         </p:txBody>
       </p:sp>
@@ -19641,9 +19642,10 @@
           <a:lstStyle/>
           <a:p>
             <a:r>
-              <a:rPr lang="en-US" sz="1400" dirty="0"/>
+              <a:rPr lang="en-US" sz="1400" dirty="0" err="1"/>
               <a:t>i</a:t>
             </a:r>
+            <a:endParaRPr lang="en-US" sz="1400" dirty="0"/>
           </a:p>
         </p:txBody>
       </p:sp>
@@ -19661,7 +19663,7 @@
         </p:nvSpPr>
         <p:spPr>
           <a:xfrm>
-            <a:off x="650700" y="3402112"/>
+            <a:off x="610998" y="3402111"/>
             <a:ext cx="402487" cy="307777"/>
           </a:xfrm>
           <a:prstGeom prst="rect">
@@ -19676,9 +19678,10 @@
           <a:lstStyle/>
           <a:p>
             <a:r>
-              <a:rPr lang="en-US" sz="1400" dirty="0"/>
+              <a:rPr lang="en-US" sz="1400" dirty="0" err="1"/>
               <a:t>i</a:t>
             </a:r>
+            <a:endParaRPr lang="en-US" sz="1400" dirty="0"/>
           </a:p>
         </p:txBody>
       </p:sp>
@@ -19696,7 +19699,7 @@
         </p:nvSpPr>
         <p:spPr>
           <a:xfrm>
-            <a:off x="345901" y="4036033"/>
+            <a:off x="302821" y="4036033"/>
             <a:ext cx="402487" cy="307777"/>
           </a:xfrm>
           <a:prstGeom prst="rect">
@@ -19711,9 +19714,10 @@
           <a:lstStyle/>
           <a:p>
             <a:r>
-              <a:rPr lang="en-US" sz="1400" dirty="0"/>
+              <a:rPr lang="en-US" sz="1400" dirty="0" err="1"/>
               <a:t>i</a:t>
             </a:r>
+            <a:endParaRPr lang="en-US" sz="1400" dirty="0"/>
           </a:p>
         </p:txBody>
       </p:sp>
@@ -19731,7 +19735,7 @@
         </p:nvGrpSpPr>
         <p:grpSpPr>
           <a:xfrm>
-            <a:off x="2938716" y="1790700"/>
+            <a:off x="2959166" y="1804296"/>
             <a:ext cx="2410334" cy="2553110"/>
             <a:chOff x="2938716" y="1790700"/>
             <a:chExt cx="2410334" cy="2553110"/>
@@ -21388,6 +21392,111 @@
           </p:txBody>
         </p:sp>
       </p:grpSp>
+      <p:sp>
+        <p:nvSpPr>
+          <p:cNvPr id="3" name="TextBox 2">
+            <a:extLst>
+              <a:ext uri="{FF2B5EF4-FFF2-40B4-BE49-F238E27FC236}">
+                <a16:creationId xmlns:a16="http://schemas.microsoft.com/office/drawing/2014/main" id="{745FBC6A-1697-4311-88C6-6A5D83113ED6}"/>
+              </a:ext>
+            </a:extLst>
+          </p:cNvPr>
+          <p:cNvSpPr txBox="1"/>
+          <p:nvPr/>
+        </p:nvSpPr>
+        <p:spPr>
+          <a:xfrm>
+            <a:off x="1430998" y="4301268"/>
+            <a:ext cx="436338" cy="369332"/>
+          </a:xfrm>
+          <a:prstGeom prst="rect">
+            <a:avLst/>
+          </a:prstGeom>
+          <a:noFill/>
+        </p:spPr>
+        <p:txBody>
+          <a:bodyPr wrap="none" rtlCol="0">
+            <a:spAutoFit/>
+          </a:bodyPr>
+          <a:lstStyle/>
+          <a:p>
+            <a:r>
+              <a:rPr lang="en-US" dirty="0"/>
+              <a:t>(a)</a:t>
+            </a:r>
+          </a:p>
+        </p:txBody>
+      </p:sp>
+      <p:sp>
+        <p:nvSpPr>
+          <p:cNvPr id="58" name="TextBox 57">
+            <a:extLst>
+              <a:ext uri="{FF2B5EF4-FFF2-40B4-BE49-F238E27FC236}">
+                <a16:creationId xmlns:a16="http://schemas.microsoft.com/office/drawing/2014/main" id="{C0847004-DA0E-41A9-9CBA-63F413091A7D}"/>
+              </a:ext>
+            </a:extLst>
+          </p:cNvPr>
+          <p:cNvSpPr txBox="1"/>
+          <p:nvPr/>
+        </p:nvSpPr>
+        <p:spPr>
+          <a:xfrm>
+            <a:off x="4095579" y="4301268"/>
+            <a:ext cx="447558" cy="369332"/>
+          </a:xfrm>
+          <a:prstGeom prst="rect">
+            <a:avLst/>
+          </a:prstGeom>
+          <a:noFill/>
+        </p:spPr>
+        <p:txBody>
+          <a:bodyPr wrap="none" rtlCol="0">
+            <a:spAutoFit/>
+          </a:bodyPr>
+          <a:lstStyle/>
+          <a:p>
+            <a:r>
+              <a:rPr lang="en-US" dirty="0"/>
+              <a:t>(b)</a:t>
+            </a:r>
+          </a:p>
+        </p:txBody>
+      </p:sp>
+      <p:sp>
+        <p:nvSpPr>
+          <p:cNvPr id="59" name="TextBox 58">
+            <a:extLst>
+              <a:ext uri="{FF2B5EF4-FFF2-40B4-BE49-F238E27FC236}">
+                <a16:creationId xmlns:a16="http://schemas.microsoft.com/office/drawing/2014/main" id="{9A3F0B85-5125-49BE-8437-BE6D1FCDCFA0}"/>
+              </a:ext>
+            </a:extLst>
+          </p:cNvPr>
+          <p:cNvSpPr txBox="1"/>
+          <p:nvPr/>
+        </p:nvSpPr>
+        <p:spPr>
+          <a:xfrm>
+            <a:off x="6843199" y="4291569"/>
+            <a:ext cx="423514" cy="369332"/>
+          </a:xfrm>
+          <a:prstGeom prst="rect">
+            <a:avLst/>
+          </a:prstGeom>
+          <a:noFill/>
+        </p:spPr>
+        <p:txBody>
+          <a:bodyPr wrap="none" rtlCol="0">
+            <a:spAutoFit/>
+          </a:bodyPr>
+          <a:lstStyle/>
+          <a:p>
+            <a:r>
+              <a:rPr lang="en-US" dirty="0"/>
+              <a:t>(c)</a:t>
+            </a:r>
+          </a:p>
+        </p:txBody>
+      </p:sp>
     </p:spTree>
     <p:extLst>
       <p:ext uri="{BB962C8B-B14F-4D97-AF65-F5344CB8AC3E}">

</xml_diff>

<commit_message>
done revising overview and concepts
</commit_message>
<xml_diff>
--- a/figures/Figures-Yi.pptx
+++ b/figures/Figures-Yi.pptx
@@ -264,7 +264,7 @@
           <a:p>
             <a:fld id="{9BED4BE8-31C7-403D-911A-3E727E0E58BF}" type="datetimeFigureOut">
               <a:rPr lang="en-US" smtClean="0"/>
-              <a:t>2/16/2022</a:t>
+              <a:t>2/17/2022</a:t>
             </a:fld>
             <a:endParaRPr lang="en-US" dirty="0"/>
           </a:p>
@@ -462,7 +462,7 @@
           <a:p>
             <a:fld id="{9BED4BE8-31C7-403D-911A-3E727E0E58BF}" type="datetimeFigureOut">
               <a:rPr lang="en-US" smtClean="0"/>
-              <a:t>2/16/2022</a:t>
+              <a:t>2/17/2022</a:t>
             </a:fld>
             <a:endParaRPr lang="en-US" dirty="0"/>
           </a:p>
@@ -670,7 +670,7 @@
           <a:p>
             <a:fld id="{9BED4BE8-31C7-403D-911A-3E727E0E58BF}" type="datetimeFigureOut">
               <a:rPr lang="en-US" smtClean="0"/>
-              <a:t>2/16/2022</a:t>
+              <a:t>2/17/2022</a:t>
             </a:fld>
             <a:endParaRPr lang="en-US" dirty="0"/>
           </a:p>
@@ -868,7 +868,7 @@
           <a:p>
             <a:fld id="{9BED4BE8-31C7-403D-911A-3E727E0E58BF}" type="datetimeFigureOut">
               <a:rPr lang="en-US" smtClean="0"/>
-              <a:t>2/16/2022</a:t>
+              <a:t>2/17/2022</a:t>
             </a:fld>
             <a:endParaRPr lang="en-US" dirty="0"/>
           </a:p>
@@ -1143,7 +1143,7 @@
           <a:p>
             <a:fld id="{9BED4BE8-31C7-403D-911A-3E727E0E58BF}" type="datetimeFigureOut">
               <a:rPr lang="en-US" smtClean="0"/>
-              <a:t>2/16/2022</a:t>
+              <a:t>2/17/2022</a:t>
             </a:fld>
             <a:endParaRPr lang="en-US" dirty="0"/>
           </a:p>
@@ -1408,7 +1408,7 @@
           <a:p>
             <a:fld id="{9BED4BE8-31C7-403D-911A-3E727E0E58BF}" type="datetimeFigureOut">
               <a:rPr lang="en-US" smtClean="0"/>
-              <a:t>2/16/2022</a:t>
+              <a:t>2/17/2022</a:t>
             </a:fld>
             <a:endParaRPr lang="en-US" dirty="0"/>
           </a:p>
@@ -1820,7 +1820,7 @@
           <a:p>
             <a:fld id="{9BED4BE8-31C7-403D-911A-3E727E0E58BF}" type="datetimeFigureOut">
               <a:rPr lang="en-US" smtClean="0"/>
-              <a:t>2/16/2022</a:t>
+              <a:t>2/17/2022</a:t>
             </a:fld>
             <a:endParaRPr lang="en-US" dirty="0"/>
           </a:p>
@@ -1961,7 +1961,7 @@
           <a:p>
             <a:fld id="{9BED4BE8-31C7-403D-911A-3E727E0E58BF}" type="datetimeFigureOut">
               <a:rPr lang="en-US" smtClean="0"/>
-              <a:t>2/16/2022</a:t>
+              <a:t>2/17/2022</a:t>
             </a:fld>
             <a:endParaRPr lang="en-US" dirty="0"/>
           </a:p>
@@ -2074,7 +2074,7 @@
           <a:p>
             <a:fld id="{9BED4BE8-31C7-403D-911A-3E727E0E58BF}" type="datetimeFigureOut">
               <a:rPr lang="en-US" smtClean="0"/>
-              <a:t>2/16/2022</a:t>
+              <a:t>2/17/2022</a:t>
             </a:fld>
             <a:endParaRPr lang="en-US" dirty="0"/>
           </a:p>
@@ -2385,7 +2385,7 @@
           <a:p>
             <a:fld id="{9BED4BE8-31C7-403D-911A-3E727E0E58BF}" type="datetimeFigureOut">
               <a:rPr lang="en-US" smtClean="0"/>
-              <a:t>2/16/2022</a:t>
+              <a:t>2/17/2022</a:t>
             </a:fld>
             <a:endParaRPr lang="en-US" dirty="0"/>
           </a:p>
@@ -2673,7 +2673,7 @@
           <a:p>
             <a:fld id="{9BED4BE8-31C7-403D-911A-3E727E0E58BF}" type="datetimeFigureOut">
               <a:rPr lang="en-US" smtClean="0"/>
-              <a:t>2/16/2022</a:t>
+              <a:t>2/17/2022</a:t>
             </a:fld>
             <a:endParaRPr lang="en-US" dirty="0"/>
           </a:p>
@@ -2914,7 +2914,7 @@
           <a:p>
             <a:fld id="{9BED4BE8-31C7-403D-911A-3E727E0E58BF}" type="datetimeFigureOut">
               <a:rPr lang="en-US" smtClean="0"/>
-              <a:t>2/16/2022</a:t>
+              <a:t>2/17/2022</a:t>
             </a:fld>
             <a:endParaRPr lang="en-US" dirty="0"/>
           </a:p>
@@ -21541,8 +21541,8 @@
         </p:nvSpPr>
         <p:spPr>
           <a:xfrm>
-            <a:off x="1287571" y="1816100"/>
-            <a:ext cx="1211104" cy="787400"/>
+            <a:off x="1287571" y="1723979"/>
+            <a:ext cx="1211104" cy="970961"/>
           </a:xfrm>
           <a:prstGeom prst="roundRect">
             <a:avLst>
@@ -21584,10 +21584,10 @@
             <a:r>
               <a:rPr lang="en-US" sz="1400" b="1" dirty="0">
                 <a:solidFill>
-                  <a:schemeClr val="tx1"/>
+                  <a:srgbClr val="0070C0"/>
                 </a:solidFill>
               </a:rPr>
-              <a:t>Building Multi-version Graphs and Context</a:t>
+              <a:t>Building Multi-version PDGs and Contexts</a:t>
             </a:r>
           </a:p>
         </p:txBody>
@@ -21649,7 +21649,7 @@
             <a:r>
               <a:rPr lang="en-US" sz="1400" b="1" dirty="0">
                 <a:solidFill>
-                  <a:schemeClr val="tx1"/>
+                  <a:srgbClr val="0070C0"/>
                 </a:solidFill>
               </a:rPr>
               <a:t>Code Change Representation Learning</a:t>
@@ -21714,7 +21714,7 @@
             <a:r>
               <a:rPr lang="en-US" sz="1400" b="1" dirty="0">
                 <a:solidFill>
-                  <a:schemeClr val="tx1"/>
+                  <a:srgbClr val="0070C0"/>
                 </a:solidFill>
               </a:rPr>
               <a:t>Clustering</a:t>
@@ -21779,10 +21779,10 @@
             <a:r>
               <a:rPr lang="en-US" sz="1400" b="1" dirty="0">
                 <a:solidFill>
-                  <a:schemeClr val="tx1"/>
+                  <a:srgbClr val="0070C0"/>
                 </a:solidFill>
               </a:rPr>
-              <a:t>Clustering Updating with the Code Clone</a:t>
+              <a:t>Updating the Clusters via Code Clone Det</a:t>
             </a:r>
           </a:p>
         </p:txBody>
@@ -23476,8 +23476,12 @@
           <a:lstStyle/>
           <a:p>
             <a:r>
-              <a:rPr lang="en-US" sz="1400" b="1" dirty="0"/>
-              <a:t>Context-aware Graph-based Code Change Clustering Learning Model</a:t>
+              <a:rPr lang="en-US" sz="1400" b="1" dirty="0">
+                <a:solidFill>
+                  <a:srgbClr val="0070C0"/>
+                </a:solidFill>
+              </a:rPr>
+              <a:t>Context-aware, Graph-based, Code Change Clustering Learning Model</a:t>
             </a:r>
           </a:p>
         </p:txBody>
@@ -23513,7 +23517,7 @@
             <a:pPr algn="ctr"/>
             <a:r>
               <a:rPr lang="en-US" sz="1400" b="1" dirty="0"/>
-              <a:t>Multi-version graphs</a:t>
+              <a:t>Multi-version PDGs</a:t>
             </a:r>
           </a:p>
         </p:txBody>
@@ -23532,8 +23536,8 @@
         </p:nvSpPr>
         <p:spPr>
           <a:xfrm>
-            <a:off x="5335252" y="983942"/>
-            <a:ext cx="1357188" cy="738664"/>
+            <a:off x="5323726" y="999102"/>
+            <a:ext cx="1357188" cy="523220"/>
           </a:xfrm>
           <a:prstGeom prst="rect">
             <a:avLst/>
@@ -23549,7 +23553,7 @@
             <a:pPr algn="ctr"/>
             <a:r>
               <a:rPr lang="en-US" sz="1400" b="1" dirty="0"/>
-              <a:t>Representation Vectors for Changed Nodes</a:t>
+              <a:t>Vectors for Changed Nodes</a:t>
             </a:r>
           </a:p>
         </p:txBody>
@@ -23568,7 +23572,7 @@
         </p:nvSpPr>
         <p:spPr>
           <a:xfrm>
-            <a:off x="7948810" y="1200759"/>
+            <a:off x="7941764" y="999102"/>
             <a:ext cx="1357188" cy="523220"/>
           </a:xfrm>
           <a:prstGeom prst="rect">
@@ -23585,7 +23589,7 @@
             <a:pPr algn="ctr"/>
             <a:r>
               <a:rPr lang="en-US" sz="1400" b="1" dirty="0"/>
-              <a:t>Clustering Results</a:t>
+              <a:t>Labels for Clusters</a:t>
             </a:r>
           </a:p>
         </p:txBody>
@@ -23604,8 +23608,8 @@
         </p:nvSpPr>
         <p:spPr>
           <a:xfrm>
-            <a:off x="10607479" y="1200759"/>
-            <a:ext cx="1626324" cy="523220"/>
+            <a:off x="10703657" y="1108611"/>
+            <a:ext cx="1369300" cy="523220"/>
           </a:xfrm>
           <a:prstGeom prst="rect">
             <a:avLst/>
@@ -23621,7 +23625,7 @@
             <a:pPr algn="ctr"/>
             <a:r>
               <a:rPr lang="en-US" sz="1400" b="1" dirty="0"/>
-              <a:t>Updated Clustering Results</a:t>
+              <a:t>Updated Clusters</a:t>
             </a:r>
           </a:p>
         </p:txBody>

</xml_diff>

<commit_message>
temp up to clustering learning
</commit_message>
<xml_diff>
--- a/figures/Figures-Yi.pptx
+++ b/figures/Figures-Yi.pptx
@@ -265,7 +265,7 @@
           <a:p>
             <a:fld id="{9BED4BE8-31C7-403D-911A-3E727E0E58BF}" type="datetimeFigureOut">
               <a:rPr lang="en-US" smtClean="0"/>
-              <a:t>2/22/2022</a:t>
+              <a:t>2/23/2022</a:t>
             </a:fld>
             <a:endParaRPr lang="en-US" dirty="0"/>
           </a:p>
@@ -463,7 +463,7 @@
           <a:p>
             <a:fld id="{9BED4BE8-31C7-403D-911A-3E727E0E58BF}" type="datetimeFigureOut">
               <a:rPr lang="en-US" smtClean="0"/>
-              <a:t>2/22/2022</a:t>
+              <a:t>2/23/2022</a:t>
             </a:fld>
             <a:endParaRPr lang="en-US" dirty="0"/>
           </a:p>
@@ -671,7 +671,7 @@
           <a:p>
             <a:fld id="{9BED4BE8-31C7-403D-911A-3E727E0E58BF}" type="datetimeFigureOut">
               <a:rPr lang="en-US" smtClean="0"/>
-              <a:t>2/22/2022</a:t>
+              <a:t>2/23/2022</a:t>
             </a:fld>
             <a:endParaRPr lang="en-US" dirty="0"/>
           </a:p>
@@ -869,7 +869,7 @@
           <a:p>
             <a:fld id="{9BED4BE8-31C7-403D-911A-3E727E0E58BF}" type="datetimeFigureOut">
               <a:rPr lang="en-US" smtClean="0"/>
-              <a:t>2/22/2022</a:t>
+              <a:t>2/23/2022</a:t>
             </a:fld>
             <a:endParaRPr lang="en-US" dirty="0"/>
           </a:p>
@@ -1144,7 +1144,7 @@
           <a:p>
             <a:fld id="{9BED4BE8-31C7-403D-911A-3E727E0E58BF}" type="datetimeFigureOut">
               <a:rPr lang="en-US" smtClean="0"/>
-              <a:t>2/22/2022</a:t>
+              <a:t>2/23/2022</a:t>
             </a:fld>
             <a:endParaRPr lang="en-US" dirty="0"/>
           </a:p>
@@ -1409,7 +1409,7 @@
           <a:p>
             <a:fld id="{9BED4BE8-31C7-403D-911A-3E727E0E58BF}" type="datetimeFigureOut">
               <a:rPr lang="en-US" smtClean="0"/>
-              <a:t>2/22/2022</a:t>
+              <a:t>2/23/2022</a:t>
             </a:fld>
             <a:endParaRPr lang="en-US" dirty="0"/>
           </a:p>
@@ -1821,7 +1821,7 @@
           <a:p>
             <a:fld id="{9BED4BE8-31C7-403D-911A-3E727E0E58BF}" type="datetimeFigureOut">
               <a:rPr lang="en-US" smtClean="0"/>
-              <a:t>2/22/2022</a:t>
+              <a:t>2/23/2022</a:t>
             </a:fld>
             <a:endParaRPr lang="en-US" dirty="0"/>
           </a:p>
@@ -1962,7 +1962,7 @@
           <a:p>
             <a:fld id="{9BED4BE8-31C7-403D-911A-3E727E0E58BF}" type="datetimeFigureOut">
               <a:rPr lang="en-US" smtClean="0"/>
-              <a:t>2/22/2022</a:t>
+              <a:t>2/23/2022</a:t>
             </a:fld>
             <a:endParaRPr lang="en-US" dirty="0"/>
           </a:p>
@@ -2075,7 +2075,7 @@
           <a:p>
             <a:fld id="{9BED4BE8-31C7-403D-911A-3E727E0E58BF}" type="datetimeFigureOut">
               <a:rPr lang="en-US" smtClean="0"/>
-              <a:t>2/22/2022</a:t>
+              <a:t>2/23/2022</a:t>
             </a:fld>
             <a:endParaRPr lang="en-US" dirty="0"/>
           </a:p>
@@ -2386,7 +2386,7 @@
           <a:p>
             <a:fld id="{9BED4BE8-31C7-403D-911A-3E727E0E58BF}" type="datetimeFigureOut">
               <a:rPr lang="en-US" smtClean="0"/>
-              <a:t>2/22/2022</a:t>
+              <a:t>2/23/2022</a:t>
             </a:fld>
             <a:endParaRPr lang="en-US" dirty="0"/>
           </a:p>
@@ -2674,7 +2674,7 @@
           <a:p>
             <a:fld id="{9BED4BE8-31C7-403D-911A-3E727E0E58BF}" type="datetimeFigureOut">
               <a:rPr lang="en-US" smtClean="0"/>
-              <a:t>2/22/2022</a:t>
+              <a:t>2/23/2022</a:t>
             </a:fld>
             <a:endParaRPr lang="en-US" dirty="0"/>
           </a:p>
@@ -2915,7 +2915,7 @@
           <a:p>
             <a:fld id="{9BED4BE8-31C7-403D-911A-3E727E0E58BF}" type="datetimeFigureOut">
               <a:rPr lang="en-US" smtClean="0"/>
-              <a:t>2/22/2022</a:t>
+              <a:t>2/23/2022</a:t>
             </a:fld>
             <a:endParaRPr lang="en-US" dirty="0"/>
           </a:p>
@@ -25194,7 +25194,12 @@
             <a:prstGeom prst="ellipse">
               <a:avLst/>
             </a:prstGeom>
-            <a:noFill/>
+            <a:solidFill>
+              <a:schemeClr val="accent6">
+                <a:lumMod val="20000"/>
+                <a:lumOff val="80000"/>
+              </a:schemeClr>
+            </a:solidFill>
             <a:ln>
               <a:solidFill>
                 <a:schemeClr val="tx1"/>
@@ -26174,7 +26179,12 @@
           <a:prstGeom prst="ellipse">
             <a:avLst/>
           </a:prstGeom>
-          <a:noFill/>
+          <a:solidFill>
+            <a:schemeClr val="accent6">
+              <a:lumMod val="20000"/>
+              <a:lumOff val="80000"/>
+            </a:schemeClr>
+          </a:solidFill>
           <a:ln>
             <a:solidFill>
               <a:schemeClr val="tx1"/>
@@ -26956,7 +26966,7 @@
         </p:nvSpPr>
         <p:spPr>
           <a:xfrm>
-            <a:off x="6161034" y="2433205"/>
+            <a:off x="6168118" y="2375787"/>
             <a:ext cx="1004063" cy="369332"/>
           </a:xfrm>
           <a:prstGeom prst="rect">
@@ -26991,8 +27001,8 @@
         </p:nvSpPr>
         <p:spPr>
           <a:xfrm>
-            <a:off x="2379116" y="847242"/>
-            <a:ext cx="1403926" cy="369332"/>
+            <a:off x="2395630" y="858028"/>
+            <a:ext cx="1403926" cy="338554"/>
           </a:xfrm>
           <a:prstGeom prst="rect">
             <a:avLst/>
@@ -27006,7 +27016,7 @@
           <a:lstStyle/>
           <a:p>
             <a:r>
-              <a:rPr lang="en-US" b="1" dirty="0"/>
+              <a:rPr lang="en-US" sz="1600" b="1" dirty="0"/>
               <a:t>Label-GCN</a:t>
             </a:r>
           </a:p>
@@ -27082,8 +27092,8 @@
         </p:nvSpPr>
         <p:spPr>
           <a:xfrm>
-            <a:off x="5784643" y="3285496"/>
-            <a:ext cx="1696803" cy="646331"/>
+            <a:off x="5429639" y="3277997"/>
+            <a:ext cx="2371062" cy="369332"/>
           </a:xfrm>
           <a:prstGeom prst="rect">
             <a:avLst/>
@@ -27118,7 +27128,7 @@
         </p:nvSpPr>
         <p:spPr>
           <a:xfrm>
-            <a:off x="8702415" y="2902498"/>
+            <a:off x="8674781" y="2903363"/>
             <a:ext cx="1696803" cy="923330"/>
           </a:xfrm>
           <a:prstGeom prst="rect">
@@ -27135,7 +27145,7 @@
             <a:pPr algn="ctr"/>
             <a:r>
               <a:rPr lang="en-US" b="1" dirty="0"/>
-              <a:t>Code Change Representation Vector</a:t>
+              <a:t>Code Change Representation Vector for S6</a:t>
             </a:r>
           </a:p>
         </p:txBody>
@@ -27154,8 +27164,8 @@
         </p:nvSpPr>
         <p:spPr>
           <a:xfrm>
-            <a:off x="7077363" y="545000"/>
-            <a:ext cx="1781325" cy="646331"/>
+            <a:off x="6679840" y="851223"/>
+            <a:ext cx="2374838" cy="338554"/>
           </a:xfrm>
           <a:prstGeom prst="rect">
             <a:avLst/>
@@ -27170,7 +27180,7 @@
           <a:p>
             <a:pPr algn="ctr"/>
             <a:r>
-              <a:rPr lang="en-US" b="1" dirty="0"/>
+              <a:rPr lang="en-US" sz="1600" b="1" dirty="0"/>
               <a:t>Fully-connected Layer</a:t>
             </a:r>
           </a:p>
@@ -27206,7 +27216,7 @@
           <a:p>
             <a:pPr algn="ctr"/>
             <a:r>
-              <a:rPr lang="en-US" b="1" dirty="0"/>
+              <a:rPr lang="en-US" b="1" i="1" dirty="0"/>
               <a:t>Hierarchical Clustering</a:t>
             </a:r>
           </a:p>
@@ -27289,6 +27299,158 @@
           </a:fontRef>
         </p:style>
       </p:cxnSp>
+      <p:sp>
+        <p:nvSpPr>
+          <p:cNvPr id="75" name="TextBox 74">
+            <a:extLst>
+              <a:ext uri="{FF2B5EF4-FFF2-40B4-BE49-F238E27FC236}">
+                <a16:creationId xmlns:a16="http://schemas.microsoft.com/office/drawing/2014/main" id="{F2C5482D-5F80-4C25-AD95-29401DA3603C}"/>
+              </a:ext>
+            </a:extLst>
+          </p:cNvPr>
+          <p:cNvSpPr txBox="1"/>
+          <p:nvPr/>
+        </p:nvSpPr>
+        <p:spPr>
+          <a:xfrm>
+            <a:off x="2615991" y="579127"/>
+            <a:ext cx="6642779" cy="369332"/>
+          </a:xfrm>
+          <a:prstGeom prst="rect">
+            <a:avLst/>
+          </a:prstGeom>
+          <a:noFill/>
+        </p:spPr>
+        <p:txBody>
+          <a:bodyPr wrap="square" rtlCol="0">
+            <a:spAutoFit/>
+          </a:bodyPr>
+          <a:lstStyle/>
+          <a:p>
+            <a:r>
+              <a:rPr lang="en-US" b="1" i="1" dirty="0"/>
+              <a:t>Context-aware, Graph-based Code Change Representation Learning </a:t>
+            </a:r>
+          </a:p>
+        </p:txBody>
+      </p:sp>
+      <p:sp>
+        <p:nvSpPr>
+          <p:cNvPr id="7" name="Right Brace 6">
+            <a:extLst>
+              <a:ext uri="{FF2B5EF4-FFF2-40B4-BE49-F238E27FC236}">
+                <a16:creationId xmlns:a16="http://schemas.microsoft.com/office/drawing/2014/main" id="{ACF470F2-6BB3-4F31-A87D-A2EB4E89346E}"/>
+              </a:ext>
+            </a:extLst>
+          </p:cNvPr>
+          <p:cNvSpPr/>
+          <p:nvPr/>
+        </p:nvSpPr>
+        <p:spPr>
+          <a:xfrm rot="16200000">
+            <a:off x="5821625" y="-2706834"/>
+            <a:ext cx="305440" cy="7203327"/>
+          </a:xfrm>
+          <a:prstGeom prst="rightBrace">
+            <a:avLst/>
+          </a:prstGeom>
+          <a:ln w="12700"/>
+        </p:spPr>
+        <p:style>
+          <a:lnRef idx="1">
+            <a:schemeClr val="accent1"/>
+          </a:lnRef>
+          <a:fillRef idx="0">
+            <a:schemeClr val="accent1"/>
+          </a:fillRef>
+          <a:effectRef idx="0">
+            <a:schemeClr val="accent1"/>
+          </a:effectRef>
+          <a:fontRef idx="minor">
+            <a:schemeClr val="tx1"/>
+          </a:fontRef>
+        </p:style>
+        <p:txBody>
+          <a:bodyPr rtlCol="0" anchor="ctr"/>
+          <a:lstStyle/>
+          <a:p>
+            <a:pPr algn="ctr"/>
+            <a:endParaRPr lang="en-US"/>
+          </a:p>
+        </p:txBody>
+      </p:sp>
+      <p:sp>
+        <p:nvSpPr>
+          <p:cNvPr id="76" name="TextBox 75">
+            <a:extLst>
+              <a:ext uri="{FF2B5EF4-FFF2-40B4-BE49-F238E27FC236}">
+                <a16:creationId xmlns:a16="http://schemas.microsoft.com/office/drawing/2014/main" id="{A02C7F24-E54E-4417-904D-3151015D7B57}"/>
+              </a:ext>
+            </a:extLst>
+          </p:cNvPr>
+          <p:cNvSpPr txBox="1"/>
+          <p:nvPr/>
+        </p:nvSpPr>
+        <p:spPr>
+          <a:xfrm>
+            <a:off x="726912" y="890532"/>
+            <a:ext cx="1403926" cy="338554"/>
+          </a:xfrm>
+          <a:prstGeom prst="rect">
+            <a:avLst/>
+          </a:prstGeom>
+          <a:noFill/>
+        </p:spPr>
+        <p:txBody>
+          <a:bodyPr wrap="square" rtlCol="0">
+            <a:spAutoFit/>
+          </a:bodyPr>
+          <a:lstStyle/>
+          <a:p>
+            <a:r>
+              <a:rPr lang="en-US" sz="1600" b="1" dirty="0"/>
+              <a:t>δ-PDG</a:t>
+            </a:r>
+          </a:p>
+        </p:txBody>
+      </p:sp>
+      <p:sp>
+        <p:nvSpPr>
+          <p:cNvPr id="79" name="TextBox 78">
+            <a:extLst>
+              <a:ext uri="{FF2B5EF4-FFF2-40B4-BE49-F238E27FC236}">
+                <a16:creationId xmlns:a16="http://schemas.microsoft.com/office/drawing/2014/main" id="{E73EFBF7-ED8E-4478-B37E-81A24C36493A}"/>
+              </a:ext>
+            </a:extLst>
+          </p:cNvPr>
+          <p:cNvSpPr txBox="1"/>
+          <p:nvPr/>
+        </p:nvSpPr>
+        <p:spPr>
+          <a:xfrm>
+            <a:off x="1183845" y="770346"/>
+            <a:ext cx="530006" cy="338554"/>
+          </a:xfrm>
+          <a:prstGeom prst="rect">
+            <a:avLst/>
+          </a:prstGeom>
+          <a:noFill/>
+        </p:spPr>
+        <p:txBody>
+          <a:bodyPr wrap="square" rtlCol="0">
+            <a:spAutoFit/>
+          </a:bodyPr>
+          <a:lstStyle/>
+          <a:p>
+            <a:pPr algn="ctr"/>
+            <a:r>
+              <a:rPr lang="en-US" sz="1600" b="1" dirty="0" err="1"/>
+              <a:t>i,j</a:t>
+            </a:r>
+            <a:endParaRPr lang="en-US" sz="1600" b="1" dirty="0"/>
+          </a:p>
+        </p:txBody>
+      </p:sp>
     </p:spTree>
     <p:extLst>
       <p:ext uri="{BB962C8B-B14F-4D97-AF65-F5344CB8AC3E}">

</xml_diff>

<commit_message>
second round up to 4.2
</commit_message>
<xml_diff>
--- a/figures/Figures-Yi.pptx
+++ b/figures/Figures-Yi.pptx
@@ -265,7 +265,7 @@
           <a:p>
             <a:fld id="{9BED4BE8-31C7-403D-911A-3E727E0E58BF}" type="datetimeFigureOut">
               <a:rPr lang="en-US" smtClean="0"/>
-              <a:t>2/23/2022</a:t>
+              <a:t>2/27/2022</a:t>
             </a:fld>
             <a:endParaRPr lang="en-US" dirty="0"/>
           </a:p>
@@ -463,7 +463,7 @@
           <a:p>
             <a:fld id="{9BED4BE8-31C7-403D-911A-3E727E0E58BF}" type="datetimeFigureOut">
               <a:rPr lang="en-US" smtClean="0"/>
-              <a:t>2/23/2022</a:t>
+              <a:t>2/27/2022</a:t>
             </a:fld>
             <a:endParaRPr lang="en-US" dirty="0"/>
           </a:p>
@@ -671,7 +671,7 @@
           <a:p>
             <a:fld id="{9BED4BE8-31C7-403D-911A-3E727E0E58BF}" type="datetimeFigureOut">
               <a:rPr lang="en-US" smtClean="0"/>
-              <a:t>2/23/2022</a:t>
+              <a:t>2/27/2022</a:t>
             </a:fld>
             <a:endParaRPr lang="en-US" dirty="0"/>
           </a:p>
@@ -869,7 +869,7 @@
           <a:p>
             <a:fld id="{9BED4BE8-31C7-403D-911A-3E727E0E58BF}" type="datetimeFigureOut">
               <a:rPr lang="en-US" smtClean="0"/>
-              <a:t>2/23/2022</a:t>
+              <a:t>2/27/2022</a:t>
             </a:fld>
             <a:endParaRPr lang="en-US" dirty="0"/>
           </a:p>
@@ -1144,7 +1144,7 @@
           <a:p>
             <a:fld id="{9BED4BE8-31C7-403D-911A-3E727E0E58BF}" type="datetimeFigureOut">
               <a:rPr lang="en-US" smtClean="0"/>
-              <a:t>2/23/2022</a:t>
+              <a:t>2/27/2022</a:t>
             </a:fld>
             <a:endParaRPr lang="en-US" dirty="0"/>
           </a:p>
@@ -1409,7 +1409,7 @@
           <a:p>
             <a:fld id="{9BED4BE8-31C7-403D-911A-3E727E0E58BF}" type="datetimeFigureOut">
               <a:rPr lang="en-US" smtClean="0"/>
-              <a:t>2/23/2022</a:t>
+              <a:t>2/27/2022</a:t>
             </a:fld>
             <a:endParaRPr lang="en-US" dirty="0"/>
           </a:p>
@@ -1821,7 +1821,7 @@
           <a:p>
             <a:fld id="{9BED4BE8-31C7-403D-911A-3E727E0E58BF}" type="datetimeFigureOut">
               <a:rPr lang="en-US" smtClean="0"/>
-              <a:t>2/23/2022</a:t>
+              <a:t>2/27/2022</a:t>
             </a:fld>
             <a:endParaRPr lang="en-US" dirty="0"/>
           </a:p>
@@ -1962,7 +1962,7 @@
           <a:p>
             <a:fld id="{9BED4BE8-31C7-403D-911A-3E727E0E58BF}" type="datetimeFigureOut">
               <a:rPr lang="en-US" smtClean="0"/>
-              <a:t>2/23/2022</a:t>
+              <a:t>2/27/2022</a:t>
             </a:fld>
             <a:endParaRPr lang="en-US" dirty="0"/>
           </a:p>
@@ -2075,7 +2075,7 @@
           <a:p>
             <a:fld id="{9BED4BE8-31C7-403D-911A-3E727E0E58BF}" type="datetimeFigureOut">
               <a:rPr lang="en-US" smtClean="0"/>
-              <a:t>2/23/2022</a:t>
+              <a:t>2/27/2022</a:t>
             </a:fld>
             <a:endParaRPr lang="en-US" dirty="0"/>
           </a:p>
@@ -2386,7 +2386,7 @@
           <a:p>
             <a:fld id="{9BED4BE8-31C7-403D-911A-3E727E0E58BF}" type="datetimeFigureOut">
               <a:rPr lang="en-US" smtClean="0"/>
-              <a:t>2/23/2022</a:t>
+              <a:t>2/27/2022</a:t>
             </a:fld>
             <a:endParaRPr lang="en-US" dirty="0"/>
           </a:p>
@@ -2674,7 +2674,7 @@
           <a:p>
             <a:fld id="{9BED4BE8-31C7-403D-911A-3E727E0E58BF}" type="datetimeFigureOut">
               <a:rPr lang="en-US" smtClean="0"/>
-              <a:t>2/23/2022</a:t>
+              <a:t>2/27/2022</a:t>
             </a:fld>
             <a:endParaRPr lang="en-US" dirty="0"/>
           </a:p>
@@ -2915,7 +2915,7 @@
           <a:p>
             <a:fld id="{9BED4BE8-31C7-403D-911A-3E727E0E58BF}" type="datetimeFigureOut">
               <a:rPr lang="en-US" smtClean="0"/>
-              <a:t>2/23/2022</a:t>
+              <a:t>2/27/2022</a:t>
             </a:fld>
             <a:endParaRPr lang="en-US" dirty="0"/>
           </a:p>
@@ -27451,6 +27451,108 @@
           </a:p>
         </p:txBody>
       </p:sp>
+      <p:grpSp>
+        <p:nvGrpSpPr>
+          <p:cNvPr id="11" name="Group 10">
+            <a:extLst>
+              <a:ext uri="{FF2B5EF4-FFF2-40B4-BE49-F238E27FC236}">
+                <a16:creationId xmlns:a16="http://schemas.microsoft.com/office/drawing/2014/main" id="{5F8B015D-07D0-4C0F-93EC-C281D8FF0863}"/>
+              </a:ext>
+            </a:extLst>
+          </p:cNvPr>
+          <p:cNvGrpSpPr/>
+          <p:nvPr/>
+        </p:nvGrpSpPr>
+        <p:grpSpPr>
+          <a:xfrm>
+            <a:off x="8130550" y="1167246"/>
+            <a:ext cx="1004063" cy="529575"/>
+            <a:chOff x="4761992" y="3977386"/>
+            <a:chExt cx="1004063" cy="529575"/>
+          </a:xfrm>
+        </p:grpSpPr>
+        <p:sp>
+          <p:nvSpPr>
+            <p:cNvPr id="80" name="TextBox 79">
+              <a:extLst>
+                <a:ext uri="{FF2B5EF4-FFF2-40B4-BE49-F238E27FC236}">
+                  <a16:creationId xmlns:a16="http://schemas.microsoft.com/office/drawing/2014/main" id="{13CA4A67-9AB2-4C5E-B21E-23CC91B1153E}"/>
+                </a:ext>
+              </a:extLst>
+            </p:cNvPr>
+            <p:cNvSpPr txBox="1"/>
+            <p:nvPr/>
+          </p:nvSpPr>
+          <p:spPr>
+            <a:xfrm>
+              <a:off x="4761992" y="3977386"/>
+              <a:ext cx="1004063" cy="461665"/>
+            </a:xfrm>
+            <a:prstGeom prst="rect">
+              <a:avLst/>
+            </a:prstGeom>
+            <a:noFill/>
+          </p:spPr>
+          <p:txBody>
+            <a:bodyPr wrap="square" rtlCol="0">
+              <a:spAutoFit/>
+            </a:bodyPr>
+            <a:lstStyle/>
+            <a:p>
+              <a:r>
+                <a:rPr lang="en-US" sz="2400" i="1" dirty="0">
+                  <a:latin typeface="Century Schoolbook" panose="02040604050505020304" pitchFamily="18" charset="0"/>
+                  <a:cs typeface="Times New Roman" panose="02020603050405020304" pitchFamily="18" charset="0"/>
+                </a:rPr>
+                <a:t>v</a:t>
+              </a:r>
+              <a:endParaRPr lang="en-US" i="1" dirty="0">
+                <a:latin typeface="Century Schoolbook" panose="02040604050505020304" pitchFamily="18" charset="0"/>
+                <a:cs typeface="Times New Roman" panose="02020603050405020304" pitchFamily="18" charset="0"/>
+              </a:endParaRPr>
+            </a:p>
+          </p:txBody>
+        </p:sp>
+        <p:sp>
+          <p:nvSpPr>
+            <p:cNvPr id="82" name="TextBox 81">
+              <a:extLst>
+                <a:ext uri="{FF2B5EF4-FFF2-40B4-BE49-F238E27FC236}">
+                  <a16:creationId xmlns:a16="http://schemas.microsoft.com/office/drawing/2014/main" id="{27BA0DA9-9DFD-4D90-9E7C-F8C2EE1FD68F}"/>
+                </a:ext>
+              </a:extLst>
+            </p:cNvPr>
+            <p:cNvSpPr txBox="1"/>
+            <p:nvPr/>
+          </p:nvSpPr>
+          <p:spPr>
+            <a:xfrm>
+              <a:off x="4936838" y="4137629"/>
+              <a:ext cx="584200" cy="369332"/>
+            </a:xfrm>
+            <a:prstGeom prst="rect">
+              <a:avLst/>
+            </a:prstGeom>
+            <a:noFill/>
+          </p:spPr>
+          <p:txBody>
+            <a:bodyPr wrap="square">
+              <a:spAutoFit/>
+            </a:bodyPr>
+            <a:lstStyle/>
+            <a:p>
+              <a:r>
+                <a:rPr lang="en-US" sz="1800" i="1" dirty="0" err="1">
+                  <a:latin typeface="Times New Roman" panose="02020603050405020304" pitchFamily="18" charset="0"/>
+                  <a:cs typeface="Times New Roman" panose="02020603050405020304" pitchFamily="18" charset="0"/>
+                </a:rPr>
+                <a:t>ctx</a:t>
+              </a:r>
+              <a:endParaRPr lang="en-US" dirty="0"/>
+            </a:p>
+          </p:txBody>
+        </p:sp>
+      </p:grpSp>
     </p:spTree>
     <p:extLst>
       <p:ext uri="{BB962C8B-B14F-4D97-AF65-F5344CB8AC3E}">

</xml_diff>

<commit_message>
overview up to step 2
</commit_message>
<xml_diff>
--- a/figures/Figures-Yi.pptx
+++ b/figures/Figures-Yi.pptx
@@ -265,7 +265,7 @@
           <a:p>
             <a:fld id="{9BED4BE8-31C7-403D-911A-3E727E0E58BF}" type="datetimeFigureOut">
               <a:rPr lang="en-US" smtClean="0"/>
-              <a:t>2/27/2022</a:t>
+              <a:t>3/6/2022</a:t>
             </a:fld>
             <a:endParaRPr lang="en-US" dirty="0"/>
           </a:p>
@@ -463,7 +463,7 @@
           <a:p>
             <a:fld id="{9BED4BE8-31C7-403D-911A-3E727E0E58BF}" type="datetimeFigureOut">
               <a:rPr lang="en-US" smtClean="0"/>
-              <a:t>2/27/2022</a:t>
+              <a:t>3/6/2022</a:t>
             </a:fld>
             <a:endParaRPr lang="en-US" dirty="0"/>
           </a:p>
@@ -671,7 +671,7 @@
           <a:p>
             <a:fld id="{9BED4BE8-31C7-403D-911A-3E727E0E58BF}" type="datetimeFigureOut">
               <a:rPr lang="en-US" smtClean="0"/>
-              <a:t>2/27/2022</a:t>
+              <a:t>3/6/2022</a:t>
             </a:fld>
             <a:endParaRPr lang="en-US" dirty="0"/>
           </a:p>
@@ -869,7 +869,7 @@
           <a:p>
             <a:fld id="{9BED4BE8-31C7-403D-911A-3E727E0E58BF}" type="datetimeFigureOut">
               <a:rPr lang="en-US" smtClean="0"/>
-              <a:t>2/27/2022</a:t>
+              <a:t>3/6/2022</a:t>
             </a:fld>
             <a:endParaRPr lang="en-US" dirty="0"/>
           </a:p>
@@ -1144,7 +1144,7 @@
           <a:p>
             <a:fld id="{9BED4BE8-31C7-403D-911A-3E727E0E58BF}" type="datetimeFigureOut">
               <a:rPr lang="en-US" smtClean="0"/>
-              <a:t>2/27/2022</a:t>
+              <a:t>3/6/2022</a:t>
             </a:fld>
             <a:endParaRPr lang="en-US" dirty="0"/>
           </a:p>
@@ -1409,7 +1409,7 @@
           <a:p>
             <a:fld id="{9BED4BE8-31C7-403D-911A-3E727E0E58BF}" type="datetimeFigureOut">
               <a:rPr lang="en-US" smtClean="0"/>
-              <a:t>2/27/2022</a:t>
+              <a:t>3/6/2022</a:t>
             </a:fld>
             <a:endParaRPr lang="en-US" dirty="0"/>
           </a:p>
@@ -1821,7 +1821,7 @@
           <a:p>
             <a:fld id="{9BED4BE8-31C7-403D-911A-3E727E0E58BF}" type="datetimeFigureOut">
               <a:rPr lang="en-US" smtClean="0"/>
-              <a:t>2/27/2022</a:t>
+              <a:t>3/6/2022</a:t>
             </a:fld>
             <a:endParaRPr lang="en-US" dirty="0"/>
           </a:p>
@@ -1962,7 +1962,7 @@
           <a:p>
             <a:fld id="{9BED4BE8-31C7-403D-911A-3E727E0E58BF}" type="datetimeFigureOut">
               <a:rPr lang="en-US" smtClean="0"/>
-              <a:t>2/27/2022</a:t>
+              <a:t>3/6/2022</a:t>
             </a:fld>
             <a:endParaRPr lang="en-US" dirty="0"/>
           </a:p>
@@ -2075,7 +2075,7 @@
           <a:p>
             <a:fld id="{9BED4BE8-31C7-403D-911A-3E727E0E58BF}" type="datetimeFigureOut">
               <a:rPr lang="en-US" smtClean="0"/>
-              <a:t>2/27/2022</a:t>
+              <a:t>3/6/2022</a:t>
             </a:fld>
             <a:endParaRPr lang="en-US" dirty="0"/>
           </a:p>
@@ -2386,7 +2386,7 @@
           <a:p>
             <a:fld id="{9BED4BE8-31C7-403D-911A-3E727E0E58BF}" type="datetimeFigureOut">
               <a:rPr lang="en-US" smtClean="0"/>
-              <a:t>2/27/2022</a:t>
+              <a:t>3/6/2022</a:t>
             </a:fld>
             <a:endParaRPr lang="en-US" dirty="0"/>
           </a:p>
@@ -2674,7 +2674,7 @@
           <a:p>
             <a:fld id="{9BED4BE8-31C7-403D-911A-3E727E0E58BF}" type="datetimeFigureOut">
               <a:rPr lang="en-US" smtClean="0"/>
-              <a:t>2/27/2022</a:t>
+              <a:t>3/6/2022</a:t>
             </a:fld>
             <a:endParaRPr lang="en-US" dirty="0"/>
           </a:p>
@@ -2915,7 +2915,7 @@
           <a:p>
             <a:fld id="{9BED4BE8-31C7-403D-911A-3E727E0E58BF}" type="datetimeFigureOut">
               <a:rPr lang="en-US" smtClean="0"/>
-              <a:t>2/27/2022</a:t>
+              <a:t>3/6/2022</a:t>
             </a:fld>
             <a:endParaRPr lang="en-US" dirty="0"/>
           </a:p>
@@ -18898,7 +18898,7 @@
                 </a:solidFill>
                 <a:latin typeface="Consolas" panose="020B0609020204030204" pitchFamily="49" charset="0"/>
               </a:rPr>
-              <a:t>2    ……</a:t>
+              <a:t>2    ...</a:t>
             </a:r>
           </a:p>
           <a:p>
@@ -19058,7 +19058,7 @@
                 </a:solidFill>
                 <a:latin typeface="Consolas" panose="020B0609020204030204" pitchFamily="49" charset="0"/>
               </a:rPr>
-              <a:t>8    ……</a:t>
+              <a:t>8    ...</a:t>
             </a:r>
           </a:p>
           <a:p>
@@ -20994,19 +20994,17 @@
                   </p:cNvPr>
                   <p:cNvCxnSpPr>
                     <a:cxnSpLocks/>
-                    <a:stCxn id="51" idx="3"/>
-                    <a:endCxn id="53" idx="3"/>
                   </p:cNvCxnSpPr>
                   <p:nvPr/>
                 </p:nvCxnSpPr>
                 <p:spPr>
                   <a:xfrm flipH="1">
-                    <a:off x="2451100" y="1529080"/>
+                    <a:off x="2436587" y="1529078"/>
                     <a:ext cx="125349" cy="2026921"/>
                   </a:xfrm>
                   <a:prstGeom prst="curvedConnector3">
                     <a:avLst>
-                      <a:gd name="adj1" fmla="val -632219"/>
+                      <a:gd name="adj1" fmla="val -239108"/>
                     </a:avLst>
                   </a:prstGeom>
                   <a:ln>
@@ -21056,7 +21054,7 @@
                   </a:xfrm>
                   <a:prstGeom prst="curvedConnector3">
                     <a:avLst>
-                      <a:gd name="adj1" fmla="val -190074"/>
+                      <a:gd name="adj1" fmla="val -164731"/>
                     </a:avLst>
                   </a:prstGeom>
                   <a:ln>
@@ -21212,7 +21210,7 @@
               </a:xfrm>
               <a:prstGeom prst="curvedConnector3">
                 <a:avLst>
-                  <a:gd name="adj1" fmla="val -98983"/>
+                  <a:gd name="adj1" fmla="val -39593"/>
                 </a:avLst>
               </a:prstGeom>
               <a:ln>
@@ -21517,6 +21515,92 @@
             <a:r>
               <a:rPr lang="en-US" dirty="0"/>
               <a:t>(c)</a:t>
+            </a:r>
+          </a:p>
+        </p:txBody>
+      </p:sp>
+      <p:sp>
+        <p:nvSpPr>
+          <p:cNvPr id="9" name="TextBox 8">
+            <a:extLst>
+              <a:ext uri="{FF2B5EF4-FFF2-40B4-BE49-F238E27FC236}">
+                <a16:creationId xmlns:a16="http://schemas.microsoft.com/office/drawing/2014/main" id="{147D27D9-3939-4C10-9C98-84606CC073B2}"/>
+              </a:ext>
+            </a:extLst>
+          </p:cNvPr>
+          <p:cNvSpPr txBox="1"/>
+          <p:nvPr/>
+        </p:nvSpPr>
+        <p:spPr>
+          <a:xfrm>
+            <a:off x="6664463" y="855979"/>
+            <a:ext cx="912429" cy="369332"/>
+          </a:xfrm>
+          <a:prstGeom prst="rect">
+            <a:avLst/>
+          </a:prstGeom>
+          <a:noFill/>
+        </p:spPr>
+        <p:txBody>
+          <a:bodyPr wrap="none" rtlCol="0">
+            <a:spAutoFit/>
+          </a:bodyPr>
+          <a:lstStyle/>
+          <a:p>
+            <a:r>
+              <a:rPr lang="en-US" dirty="0">
+                <a:latin typeface="Symbol" panose="05050102010706020507" pitchFamily="18" charset="2"/>
+              </a:rPr>
+              <a:t>d-</a:t>
+            </a:r>
+            <a:r>
+              <a:rPr lang="nn-NO" b="1" dirty="0">
+                <a:solidFill>
+                  <a:srgbClr val="000000"/>
+                </a:solidFill>
+                <a:latin typeface="Times New Roman" panose="02020603050405020304" pitchFamily="18" charset="0"/>
+                <a:cs typeface="Times New Roman" panose="02020603050405020304" pitchFamily="18" charset="0"/>
+              </a:rPr>
+              <a:t>PDG</a:t>
+            </a:r>
+            <a:endParaRPr lang="en-US" b="1" dirty="0">
+              <a:latin typeface="Times New Roman" panose="02020603050405020304" pitchFamily="18" charset="0"/>
+              <a:cs typeface="Times New Roman" panose="02020603050405020304" pitchFamily="18" charset="0"/>
+            </a:endParaRPr>
+          </a:p>
+        </p:txBody>
+      </p:sp>
+      <p:sp>
+        <p:nvSpPr>
+          <p:cNvPr id="62" name="TextBox 61">
+            <a:extLst>
+              <a:ext uri="{FF2B5EF4-FFF2-40B4-BE49-F238E27FC236}">
+                <a16:creationId xmlns:a16="http://schemas.microsoft.com/office/drawing/2014/main" id="{834E5447-99E9-498C-A767-5D6E7CA15AD1}"/>
+              </a:ext>
+            </a:extLst>
+          </p:cNvPr>
+          <p:cNvSpPr txBox="1"/>
+          <p:nvPr/>
+        </p:nvSpPr>
+        <p:spPr>
+          <a:xfrm>
+            <a:off x="7409561" y="732868"/>
+            <a:ext cx="402487" cy="307777"/>
+          </a:xfrm>
+          <a:prstGeom prst="rect">
+            <a:avLst/>
+          </a:prstGeom>
+          <a:noFill/>
+        </p:spPr>
+        <p:txBody>
+          <a:bodyPr wrap="square" rtlCol="0">
+            <a:spAutoFit/>
+          </a:bodyPr>
+          <a:lstStyle/>
+          <a:p>
+            <a:r>
+              <a:rPr lang="en-US" sz="1400" dirty="0"/>
+              <a:t>i, j</a:t>
             </a:r>
           </a:p>
         </p:txBody>

</xml_diff>

<commit_message>
up to figure overview
</commit_message>
<xml_diff>
--- a/figures/Figures-Yi.pptx
+++ b/figures/Figures-Yi.pptx
@@ -265,7 +265,7 @@
           <a:p>
             <a:fld id="{9BED4BE8-31C7-403D-911A-3E727E0E58BF}" type="datetimeFigureOut">
               <a:rPr lang="en-US" smtClean="0"/>
-              <a:t>3/6/2022</a:t>
+              <a:t>3/7/2022</a:t>
             </a:fld>
             <a:endParaRPr lang="en-US" dirty="0"/>
           </a:p>
@@ -463,7 +463,7 @@
           <a:p>
             <a:fld id="{9BED4BE8-31C7-403D-911A-3E727E0E58BF}" type="datetimeFigureOut">
               <a:rPr lang="en-US" smtClean="0"/>
-              <a:t>3/6/2022</a:t>
+              <a:t>3/7/2022</a:t>
             </a:fld>
             <a:endParaRPr lang="en-US" dirty="0"/>
           </a:p>
@@ -671,7 +671,7 @@
           <a:p>
             <a:fld id="{9BED4BE8-31C7-403D-911A-3E727E0E58BF}" type="datetimeFigureOut">
               <a:rPr lang="en-US" smtClean="0"/>
-              <a:t>3/6/2022</a:t>
+              <a:t>3/7/2022</a:t>
             </a:fld>
             <a:endParaRPr lang="en-US" dirty="0"/>
           </a:p>
@@ -869,7 +869,7 @@
           <a:p>
             <a:fld id="{9BED4BE8-31C7-403D-911A-3E727E0E58BF}" type="datetimeFigureOut">
               <a:rPr lang="en-US" smtClean="0"/>
-              <a:t>3/6/2022</a:t>
+              <a:t>3/7/2022</a:t>
             </a:fld>
             <a:endParaRPr lang="en-US" dirty="0"/>
           </a:p>
@@ -1144,7 +1144,7 @@
           <a:p>
             <a:fld id="{9BED4BE8-31C7-403D-911A-3E727E0E58BF}" type="datetimeFigureOut">
               <a:rPr lang="en-US" smtClean="0"/>
-              <a:t>3/6/2022</a:t>
+              <a:t>3/7/2022</a:t>
             </a:fld>
             <a:endParaRPr lang="en-US" dirty="0"/>
           </a:p>
@@ -1409,7 +1409,7 @@
           <a:p>
             <a:fld id="{9BED4BE8-31C7-403D-911A-3E727E0E58BF}" type="datetimeFigureOut">
               <a:rPr lang="en-US" smtClean="0"/>
-              <a:t>3/6/2022</a:t>
+              <a:t>3/7/2022</a:t>
             </a:fld>
             <a:endParaRPr lang="en-US" dirty="0"/>
           </a:p>
@@ -1821,7 +1821,7 @@
           <a:p>
             <a:fld id="{9BED4BE8-31C7-403D-911A-3E727E0E58BF}" type="datetimeFigureOut">
               <a:rPr lang="en-US" smtClean="0"/>
-              <a:t>3/6/2022</a:t>
+              <a:t>3/7/2022</a:t>
             </a:fld>
             <a:endParaRPr lang="en-US" dirty="0"/>
           </a:p>
@@ -1962,7 +1962,7 @@
           <a:p>
             <a:fld id="{9BED4BE8-31C7-403D-911A-3E727E0E58BF}" type="datetimeFigureOut">
               <a:rPr lang="en-US" smtClean="0"/>
-              <a:t>3/6/2022</a:t>
+              <a:t>3/7/2022</a:t>
             </a:fld>
             <a:endParaRPr lang="en-US" dirty="0"/>
           </a:p>
@@ -2075,7 +2075,7 @@
           <a:p>
             <a:fld id="{9BED4BE8-31C7-403D-911A-3E727E0E58BF}" type="datetimeFigureOut">
               <a:rPr lang="en-US" smtClean="0"/>
-              <a:t>3/6/2022</a:t>
+              <a:t>3/7/2022</a:t>
             </a:fld>
             <a:endParaRPr lang="en-US" dirty="0"/>
           </a:p>
@@ -2386,7 +2386,7 @@
           <a:p>
             <a:fld id="{9BED4BE8-31C7-403D-911A-3E727E0E58BF}" type="datetimeFigureOut">
               <a:rPr lang="en-US" smtClean="0"/>
-              <a:t>3/6/2022</a:t>
+              <a:t>3/7/2022</a:t>
             </a:fld>
             <a:endParaRPr lang="en-US" dirty="0"/>
           </a:p>
@@ -2674,7 +2674,7 @@
           <a:p>
             <a:fld id="{9BED4BE8-31C7-403D-911A-3E727E0E58BF}" type="datetimeFigureOut">
               <a:rPr lang="en-US" smtClean="0"/>
-              <a:t>3/6/2022</a:t>
+              <a:t>3/7/2022</a:t>
             </a:fld>
             <a:endParaRPr lang="en-US" dirty="0"/>
           </a:p>
@@ -2915,7 +2915,7 @@
           <a:p>
             <a:fld id="{9BED4BE8-31C7-403D-911A-3E727E0E58BF}" type="datetimeFigureOut">
               <a:rPr lang="en-US" smtClean="0"/>
-              <a:t>3/6/2022</a:t>
+              <a:t>3/7/2022</a:t>
             </a:fld>
             <a:endParaRPr lang="en-US" dirty="0"/>
           </a:p>
@@ -21692,10 +21692,10 @@
             <a:r>
               <a:rPr lang="en-US" sz="1400" b="1" dirty="0">
                 <a:solidFill>
-                  <a:srgbClr val="0070C0"/>
+                  <a:schemeClr val="tx1"/>
                 </a:solidFill>
               </a:rPr>
-              <a:t>Building Multi-version PDGs and Contexts</a:t>
+              <a:t>Building Multi-version PDG and Contexts</a:t>
             </a:r>
           </a:p>
         </p:txBody>
@@ -21757,7 +21757,7 @@
             <a:r>
               <a:rPr lang="en-US" sz="1400" b="1" dirty="0">
                 <a:solidFill>
-                  <a:srgbClr val="0070C0"/>
+                  <a:schemeClr val="tx1"/>
                 </a:solidFill>
               </a:rPr>
               <a:t>Code Change Representation Learning</a:t>
@@ -21779,8 +21779,8 @@
         </p:nvSpPr>
         <p:spPr>
           <a:xfrm>
-            <a:off x="6791824" y="2053638"/>
-            <a:ext cx="1074566" cy="329042"/>
+            <a:off x="6593324" y="1870597"/>
+            <a:ext cx="1283226" cy="706923"/>
           </a:xfrm>
           <a:prstGeom prst="roundRect">
             <a:avLst>
@@ -21822,10 +21822,10 @@
             <a:r>
               <a:rPr lang="en-US" sz="1400" b="1" dirty="0">
                 <a:solidFill>
-                  <a:srgbClr val="0070C0"/>
+                  <a:schemeClr val="tx1"/>
                 </a:solidFill>
               </a:rPr>
-              <a:t>Clustering</a:t>
+              <a:t>Agglomerative Clustering</a:t>
             </a:r>
           </a:p>
         </p:txBody>
@@ -21887,10 +21887,10 @@
             <a:r>
               <a:rPr lang="en-US" sz="1400" b="1" dirty="0">
                 <a:solidFill>
-                  <a:srgbClr val="0070C0"/>
+                  <a:schemeClr val="tx1"/>
                 </a:solidFill>
               </a:rPr>
-              <a:t>Updating the Clusters via Code Clone Det</a:t>
+              <a:t>Clusters Updating via Clone Detection</a:t>
             </a:r>
           </a:p>
         </p:txBody>
@@ -22298,7 +22298,7 @@
         </p:nvGrpSpPr>
         <p:grpSpPr>
           <a:xfrm rot="5400000">
-            <a:off x="5877281" y="1377474"/>
+            <a:off x="5770601" y="1377474"/>
             <a:ext cx="250078" cy="810055"/>
             <a:chOff x="6068497" y="1766458"/>
             <a:chExt cx="250078" cy="810055"/>
@@ -22551,7 +22551,7 @@
         </p:nvGrpSpPr>
         <p:grpSpPr>
           <a:xfrm rot="5400000">
-            <a:off x="5877281" y="1721532"/>
+            <a:off x="5770601" y="1721532"/>
             <a:ext cx="250078" cy="810055"/>
             <a:chOff x="6068497" y="1766458"/>
             <a:chExt cx="250078" cy="810055"/>
@@ -22804,7 +22804,7 @@
         </p:nvGrpSpPr>
         <p:grpSpPr>
           <a:xfrm rot="5400000">
-            <a:off x="5877281" y="2258854"/>
+            <a:off x="5770601" y="2258854"/>
             <a:ext cx="250078" cy="810055"/>
             <a:chOff x="6068497" y="1766458"/>
             <a:chExt cx="250078" cy="810055"/>
@@ -23057,7 +23057,7 @@
         </p:nvSpPr>
         <p:spPr>
           <a:xfrm>
-            <a:off x="5747861" y="2172774"/>
+            <a:off x="5641181" y="2172774"/>
             <a:ext cx="863600" cy="369332"/>
           </a:xfrm>
           <a:prstGeom prst="rect">
@@ -23584,11 +23584,7 @@
           <a:lstStyle/>
           <a:p>
             <a:r>
-              <a:rPr lang="en-US" sz="1400" b="1" dirty="0">
-                <a:solidFill>
-                  <a:srgbClr val="0070C0"/>
-                </a:solidFill>
-              </a:rPr>
+              <a:rPr lang="en-US" sz="1400" b="1" dirty="0"/>
               <a:t>Context-aware, Graph-based, Code Change Clustering Learning Model</a:t>
             </a:r>
           </a:p>
@@ -23625,7 +23621,7 @@
             <a:pPr algn="ctr"/>
             <a:r>
               <a:rPr lang="en-US" sz="1400" b="1" dirty="0"/>
-              <a:t>Multi-version PDGs</a:t>
+              <a:t>Multi-version PDG</a:t>
             </a:r>
           </a:p>
         </p:txBody>
@@ -23644,7 +23640,7 @@
         </p:nvSpPr>
         <p:spPr>
           <a:xfrm>
-            <a:off x="5323726" y="999102"/>
+            <a:off x="5217046" y="999102"/>
             <a:ext cx="1357188" cy="523220"/>
           </a:xfrm>
           <a:prstGeom prst="rect">
@@ -23860,7 +23856,7 @@
         </p:nvSpPr>
         <p:spPr>
           <a:xfrm>
-            <a:off x="5273086" y="2129902"/>
+            <a:off x="5222286" y="2129902"/>
             <a:ext cx="220614" cy="156098"/>
           </a:xfrm>
           <a:prstGeom prst="rightArrow">
@@ -23914,7 +23910,7 @@
         </p:nvSpPr>
         <p:spPr>
           <a:xfrm>
-            <a:off x="6508858" y="2129902"/>
+            <a:off x="6346298" y="2129902"/>
             <a:ext cx="220614" cy="156098"/>
           </a:xfrm>
           <a:prstGeom prst="rightArrow">
@@ -24022,7 +24018,7 @@
         </p:nvSpPr>
         <p:spPr>
           <a:xfrm>
-            <a:off x="9070668" y="2129902"/>
+            <a:off x="9090988" y="2129902"/>
             <a:ext cx="220614" cy="156098"/>
           </a:xfrm>
           <a:prstGeom prst="rightArrow">

</xml_diff>

<commit_message>
second round up to embedding fig
</commit_message>
<xml_diff>
--- a/figures/Figures-Yi.pptx
+++ b/figures/Figures-Yi.pptx
@@ -27488,8 +27488,12 @@
           <a:lstStyle/>
           <a:p>
             <a:r>
+              <a:rPr lang="en-US" sz="1600" dirty="0"/>
+              <a:t>δ</a:t>
+            </a:r>
+            <a:r>
               <a:rPr lang="en-US" sz="1600" b="1" dirty="0"/>
-              <a:t>δ-PDG</a:t>
+              <a:t>-PDG</a:t>
             </a:r>
           </a:p>
         </p:txBody>
@@ -27546,9 +27550,9 @@
         <p:grpSpPr>
           <a:xfrm>
             <a:off x="8130550" y="1167246"/>
-            <a:ext cx="1004063" cy="529575"/>
+            <a:ext cx="1004063" cy="514344"/>
             <a:chOff x="4761992" y="3977386"/>
-            <a:chExt cx="1004063" cy="529575"/>
+            <a:chExt cx="1004063" cy="514344"/>
           </a:xfrm>
         </p:grpSpPr>
         <p:sp>
@@ -27607,7 +27611,7 @@
           </p:nvSpPr>
           <p:spPr>
             <a:xfrm>
-              <a:off x="4936838" y="4137629"/>
+              <a:off x="4908000" y="4122398"/>
               <a:ext cx="584200" cy="369332"/>
             </a:xfrm>
             <a:prstGeom prst="rect">
@@ -27629,6 +27633,797 @@
                 <a:t>ctx</a:t>
               </a:r>
               <a:endParaRPr lang="en-US" dirty="0"/>
+            </a:p>
+          </p:txBody>
+        </p:sp>
+      </p:grpSp>
+      <p:grpSp>
+        <p:nvGrpSpPr>
+          <p:cNvPr id="10" name="Group 9">
+            <a:extLst>
+              <a:ext uri="{FF2B5EF4-FFF2-40B4-BE49-F238E27FC236}">
+                <a16:creationId xmlns:a16="http://schemas.microsoft.com/office/drawing/2014/main" id="{6510A126-95A9-4CBF-87DD-CFDC03584C19}"/>
+              </a:ext>
+            </a:extLst>
+          </p:cNvPr>
+          <p:cNvGrpSpPr/>
+          <p:nvPr/>
+        </p:nvGrpSpPr>
+        <p:grpSpPr>
+          <a:xfrm>
+            <a:off x="1208078" y="1179259"/>
+            <a:ext cx="455101" cy="572127"/>
+            <a:chOff x="1507986" y="361574"/>
+            <a:chExt cx="455101" cy="572127"/>
+          </a:xfrm>
+        </p:grpSpPr>
+        <p:sp>
+          <p:nvSpPr>
+            <p:cNvPr id="88" name="TextBox 87">
+              <a:extLst>
+                <a:ext uri="{FF2B5EF4-FFF2-40B4-BE49-F238E27FC236}">
+                  <a16:creationId xmlns:a16="http://schemas.microsoft.com/office/drawing/2014/main" id="{39EF8AA8-5BAD-4099-B846-9AC53224EE1E}"/>
+                </a:ext>
+              </a:extLst>
+            </p:cNvPr>
+            <p:cNvSpPr txBox="1"/>
+            <p:nvPr/>
+          </p:nvSpPr>
+          <p:spPr>
+            <a:xfrm>
+              <a:off x="1507986" y="361574"/>
+              <a:ext cx="370614" cy="523220"/>
+            </a:xfrm>
+            <a:prstGeom prst="rect">
+              <a:avLst/>
+            </a:prstGeom>
+            <a:noFill/>
+          </p:spPr>
+          <p:txBody>
+            <a:bodyPr wrap="none" rtlCol="0">
+              <a:spAutoFit/>
+            </a:bodyPr>
+            <a:lstStyle/>
+            <a:p>
+              <a:r>
+                <a:rPr lang="en-US" sz="2800" i="1" dirty="0">
+                  <a:latin typeface="Century Schoolbook" panose="02040604050505020304" pitchFamily="18" charset="0"/>
+                  <a:cs typeface="Times New Roman" panose="02020603050405020304" pitchFamily="18" charset="0"/>
+                </a:rPr>
+                <a:t>v</a:t>
+              </a:r>
+              <a:endParaRPr lang="en-US" sz="2800" i="1" dirty="0">
+                <a:latin typeface="Times New Roman" panose="02020603050405020304" pitchFamily="18" charset="0"/>
+                <a:cs typeface="Times New Roman" panose="02020603050405020304" pitchFamily="18" charset="0"/>
+              </a:endParaRPr>
+            </a:p>
+          </p:txBody>
+        </p:sp>
+        <p:sp>
+          <p:nvSpPr>
+            <p:cNvPr id="89" name="TextBox 88">
+              <a:extLst>
+                <a:ext uri="{FF2B5EF4-FFF2-40B4-BE49-F238E27FC236}">
+                  <a16:creationId xmlns:a16="http://schemas.microsoft.com/office/drawing/2014/main" id="{E3D6C57E-91C0-437C-B771-65E43EEF9F0A}"/>
+                </a:ext>
+              </a:extLst>
+            </p:cNvPr>
+            <p:cNvSpPr txBox="1"/>
+            <p:nvPr/>
+          </p:nvSpPr>
+          <p:spPr>
+            <a:xfrm>
+              <a:off x="1669542" y="621813"/>
+              <a:ext cx="293545" cy="311888"/>
+            </a:xfrm>
+            <a:prstGeom prst="rect">
+              <a:avLst/>
+            </a:prstGeom>
+            <a:noFill/>
+          </p:spPr>
+          <p:txBody>
+            <a:bodyPr wrap="square" rtlCol="0">
+              <a:spAutoFit/>
+            </a:bodyPr>
+            <a:lstStyle/>
+            <a:p>
+              <a:r>
+                <a:rPr lang="en-US" sz="1400" i="1" dirty="0">
+                  <a:latin typeface="Times New Roman" panose="02020603050405020304" pitchFamily="18" charset="0"/>
+                  <a:cs typeface="Times New Roman" panose="02020603050405020304" pitchFamily="18" charset="0"/>
+                </a:rPr>
+                <a:t>3</a:t>
+              </a:r>
+            </a:p>
+          </p:txBody>
+        </p:sp>
+      </p:grpSp>
+      <p:grpSp>
+        <p:nvGrpSpPr>
+          <p:cNvPr id="93" name="Group 92">
+            <a:extLst>
+              <a:ext uri="{FF2B5EF4-FFF2-40B4-BE49-F238E27FC236}">
+                <a16:creationId xmlns:a16="http://schemas.microsoft.com/office/drawing/2014/main" id="{B0D81226-D57B-48B8-9958-8A3F4B5C481E}"/>
+              </a:ext>
+            </a:extLst>
+          </p:cNvPr>
+          <p:cNvGrpSpPr/>
+          <p:nvPr/>
+        </p:nvGrpSpPr>
+        <p:grpSpPr>
+          <a:xfrm>
+            <a:off x="1914735" y="1419980"/>
+            <a:ext cx="449772" cy="578160"/>
+            <a:chOff x="1507986" y="361574"/>
+            <a:chExt cx="449772" cy="578160"/>
+          </a:xfrm>
+        </p:grpSpPr>
+        <p:sp>
+          <p:nvSpPr>
+            <p:cNvPr id="94" name="TextBox 93">
+              <a:extLst>
+                <a:ext uri="{FF2B5EF4-FFF2-40B4-BE49-F238E27FC236}">
+                  <a16:creationId xmlns:a16="http://schemas.microsoft.com/office/drawing/2014/main" id="{795B2593-CB2C-4C94-AA8A-C4770812A805}"/>
+                </a:ext>
+              </a:extLst>
+            </p:cNvPr>
+            <p:cNvSpPr txBox="1"/>
+            <p:nvPr/>
+          </p:nvSpPr>
+          <p:spPr>
+            <a:xfrm>
+              <a:off x="1507986" y="361574"/>
+              <a:ext cx="370614" cy="523220"/>
+            </a:xfrm>
+            <a:prstGeom prst="rect">
+              <a:avLst/>
+            </a:prstGeom>
+            <a:noFill/>
+          </p:spPr>
+          <p:txBody>
+            <a:bodyPr wrap="none" rtlCol="0">
+              <a:spAutoFit/>
+            </a:bodyPr>
+            <a:lstStyle/>
+            <a:p>
+              <a:r>
+                <a:rPr lang="en-US" sz="2800" i="1" dirty="0">
+                  <a:latin typeface="Century Schoolbook" panose="02040604050505020304" pitchFamily="18" charset="0"/>
+                  <a:cs typeface="Times New Roman" panose="02020603050405020304" pitchFamily="18" charset="0"/>
+                </a:rPr>
+                <a:t>v</a:t>
+              </a:r>
+              <a:endParaRPr lang="en-US" sz="2800" i="1" dirty="0">
+                <a:latin typeface="Times New Roman" panose="02020603050405020304" pitchFamily="18" charset="0"/>
+                <a:cs typeface="Times New Roman" panose="02020603050405020304" pitchFamily="18" charset="0"/>
+              </a:endParaRPr>
+            </a:p>
+          </p:txBody>
+        </p:sp>
+        <p:sp>
+          <p:nvSpPr>
+            <p:cNvPr id="103" name="TextBox 102">
+              <a:extLst>
+                <a:ext uri="{FF2B5EF4-FFF2-40B4-BE49-F238E27FC236}">
+                  <a16:creationId xmlns:a16="http://schemas.microsoft.com/office/drawing/2014/main" id="{8A9852DE-6CA8-4C53-B831-A14E133EDDFF}"/>
+                </a:ext>
+              </a:extLst>
+            </p:cNvPr>
+            <p:cNvSpPr txBox="1"/>
+            <p:nvPr/>
+          </p:nvSpPr>
+          <p:spPr>
+            <a:xfrm>
+              <a:off x="1664213" y="627846"/>
+              <a:ext cx="293545" cy="311888"/>
+            </a:xfrm>
+            <a:prstGeom prst="rect">
+              <a:avLst/>
+            </a:prstGeom>
+            <a:noFill/>
+          </p:spPr>
+          <p:txBody>
+            <a:bodyPr wrap="square" rtlCol="0">
+              <a:spAutoFit/>
+            </a:bodyPr>
+            <a:lstStyle/>
+            <a:p>
+              <a:r>
+                <a:rPr lang="en-US" sz="1400" i="1" dirty="0">
+                  <a:latin typeface="Times New Roman" panose="02020603050405020304" pitchFamily="18" charset="0"/>
+                  <a:cs typeface="Times New Roman" panose="02020603050405020304" pitchFamily="18" charset="0"/>
+                </a:rPr>
+                <a:t>6</a:t>
+              </a:r>
+            </a:p>
+          </p:txBody>
+        </p:sp>
+      </p:grpSp>
+      <p:grpSp>
+        <p:nvGrpSpPr>
+          <p:cNvPr id="104" name="Group 103">
+            <a:extLst>
+              <a:ext uri="{FF2B5EF4-FFF2-40B4-BE49-F238E27FC236}">
+                <a16:creationId xmlns:a16="http://schemas.microsoft.com/office/drawing/2014/main" id="{657459A6-6501-4CED-B608-9FA41E6A1C43}"/>
+              </a:ext>
+            </a:extLst>
+          </p:cNvPr>
+          <p:cNvGrpSpPr/>
+          <p:nvPr/>
+        </p:nvGrpSpPr>
+        <p:grpSpPr>
+          <a:xfrm>
+            <a:off x="1111552" y="1780351"/>
+            <a:ext cx="449934" cy="578085"/>
+            <a:chOff x="1507986" y="361574"/>
+            <a:chExt cx="449934" cy="578085"/>
+          </a:xfrm>
+        </p:grpSpPr>
+        <p:sp>
+          <p:nvSpPr>
+            <p:cNvPr id="105" name="TextBox 104">
+              <a:extLst>
+                <a:ext uri="{FF2B5EF4-FFF2-40B4-BE49-F238E27FC236}">
+                  <a16:creationId xmlns:a16="http://schemas.microsoft.com/office/drawing/2014/main" id="{B4AB8AA9-5C90-4D72-84FF-0C46EFB0DF15}"/>
+                </a:ext>
+              </a:extLst>
+            </p:cNvPr>
+            <p:cNvSpPr txBox="1"/>
+            <p:nvPr/>
+          </p:nvSpPr>
+          <p:spPr>
+            <a:xfrm>
+              <a:off x="1507986" y="361574"/>
+              <a:ext cx="370614" cy="523220"/>
+            </a:xfrm>
+            <a:prstGeom prst="rect">
+              <a:avLst/>
+            </a:prstGeom>
+            <a:noFill/>
+          </p:spPr>
+          <p:txBody>
+            <a:bodyPr wrap="none" rtlCol="0">
+              <a:spAutoFit/>
+            </a:bodyPr>
+            <a:lstStyle/>
+            <a:p>
+              <a:r>
+                <a:rPr lang="en-US" sz="2800" i="1" dirty="0">
+                  <a:latin typeface="Century Schoolbook" panose="02040604050505020304" pitchFamily="18" charset="0"/>
+                  <a:cs typeface="Times New Roman" panose="02020603050405020304" pitchFamily="18" charset="0"/>
+                </a:rPr>
+                <a:t>v</a:t>
+              </a:r>
+              <a:endParaRPr lang="en-US" sz="2800" i="1" dirty="0">
+                <a:latin typeface="Times New Roman" panose="02020603050405020304" pitchFamily="18" charset="0"/>
+                <a:cs typeface="Times New Roman" panose="02020603050405020304" pitchFamily="18" charset="0"/>
+              </a:endParaRPr>
+            </a:p>
+          </p:txBody>
+        </p:sp>
+        <p:sp>
+          <p:nvSpPr>
+            <p:cNvPr id="107" name="TextBox 106">
+              <a:extLst>
+                <a:ext uri="{FF2B5EF4-FFF2-40B4-BE49-F238E27FC236}">
+                  <a16:creationId xmlns:a16="http://schemas.microsoft.com/office/drawing/2014/main" id="{91B37361-21FE-4B48-A5DF-BC065B034331}"/>
+                </a:ext>
+              </a:extLst>
+            </p:cNvPr>
+            <p:cNvSpPr txBox="1"/>
+            <p:nvPr/>
+          </p:nvSpPr>
+          <p:spPr>
+            <a:xfrm>
+              <a:off x="1664375" y="627771"/>
+              <a:ext cx="293545" cy="311888"/>
+            </a:xfrm>
+            <a:prstGeom prst="rect">
+              <a:avLst/>
+            </a:prstGeom>
+            <a:noFill/>
+          </p:spPr>
+          <p:txBody>
+            <a:bodyPr wrap="square" rtlCol="0">
+              <a:spAutoFit/>
+            </a:bodyPr>
+            <a:lstStyle/>
+            <a:p>
+              <a:r>
+                <a:rPr lang="en-US" sz="1400" i="1" dirty="0">
+                  <a:latin typeface="Times New Roman" panose="02020603050405020304" pitchFamily="18" charset="0"/>
+                  <a:cs typeface="Times New Roman" panose="02020603050405020304" pitchFamily="18" charset="0"/>
+                </a:rPr>
+                <a:t>4</a:t>
+              </a:r>
+            </a:p>
+          </p:txBody>
+        </p:sp>
+      </p:grpSp>
+      <p:grpSp>
+        <p:nvGrpSpPr>
+          <p:cNvPr id="108" name="Group 107">
+            <a:extLst>
+              <a:ext uri="{FF2B5EF4-FFF2-40B4-BE49-F238E27FC236}">
+                <a16:creationId xmlns:a16="http://schemas.microsoft.com/office/drawing/2014/main" id="{3070470F-22D2-4A2E-A83F-F0B19B028F0E}"/>
+              </a:ext>
+            </a:extLst>
+          </p:cNvPr>
+          <p:cNvGrpSpPr/>
+          <p:nvPr/>
+        </p:nvGrpSpPr>
+        <p:grpSpPr>
+          <a:xfrm>
+            <a:off x="1238889" y="2673784"/>
+            <a:ext cx="462013" cy="573498"/>
+            <a:chOff x="1507986" y="361574"/>
+            <a:chExt cx="462013" cy="573498"/>
+          </a:xfrm>
+        </p:grpSpPr>
+        <p:sp>
+          <p:nvSpPr>
+            <p:cNvPr id="110" name="TextBox 109">
+              <a:extLst>
+                <a:ext uri="{FF2B5EF4-FFF2-40B4-BE49-F238E27FC236}">
+                  <a16:creationId xmlns:a16="http://schemas.microsoft.com/office/drawing/2014/main" id="{4D1C5970-D483-4878-AADA-43068958AABB}"/>
+                </a:ext>
+              </a:extLst>
+            </p:cNvPr>
+            <p:cNvSpPr txBox="1"/>
+            <p:nvPr/>
+          </p:nvSpPr>
+          <p:spPr>
+            <a:xfrm>
+              <a:off x="1507986" y="361574"/>
+              <a:ext cx="370614" cy="523220"/>
+            </a:xfrm>
+            <a:prstGeom prst="rect">
+              <a:avLst/>
+            </a:prstGeom>
+            <a:noFill/>
+          </p:spPr>
+          <p:txBody>
+            <a:bodyPr wrap="none" rtlCol="0">
+              <a:spAutoFit/>
+            </a:bodyPr>
+            <a:lstStyle/>
+            <a:p>
+              <a:r>
+                <a:rPr lang="en-US" sz="2800" i="1" dirty="0">
+                  <a:latin typeface="Century Schoolbook" panose="02040604050505020304" pitchFamily="18" charset="0"/>
+                  <a:cs typeface="Times New Roman" panose="02020603050405020304" pitchFamily="18" charset="0"/>
+                </a:rPr>
+                <a:t>v</a:t>
+              </a:r>
+              <a:endParaRPr lang="en-US" sz="2800" i="1" dirty="0">
+                <a:latin typeface="Times New Roman" panose="02020603050405020304" pitchFamily="18" charset="0"/>
+                <a:cs typeface="Times New Roman" panose="02020603050405020304" pitchFamily="18" charset="0"/>
+              </a:endParaRPr>
+            </a:p>
+          </p:txBody>
+        </p:sp>
+        <p:sp>
+          <p:nvSpPr>
+            <p:cNvPr id="112" name="TextBox 111">
+              <a:extLst>
+                <a:ext uri="{FF2B5EF4-FFF2-40B4-BE49-F238E27FC236}">
+                  <a16:creationId xmlns:a16="http://schemas.microsoft.com/office/drawing/2014/main" id="{E4710C20-4F0B-4B52-8F4C-8DB4811CE6F0}"/>
+                </a:ext>
+              </a:extLst>
+            </p:cNvPr>
+            <p:cNvSpPr txBox="1"/>
+            <p:nvPr/>
+          </p:nvSpPr>
+          <p:spPr>
+            <a:xfrm>
+              <a:off x="1676454" y="623184"/>
+              <a:ext cx="293545" cy="311888"/>
+            </a:xfrm>
+            <a:prstGeom prst="rect">
+              <a:avLst/>
+            </a:prstGeom>
+            <a:noFill/>
+          </p:spPr>
+          <p:txBody>
+            <a:bodyPr wrap="square" rtlCol="0">
+              <a:spAutoFit/>
+            </a:bodyPr>
+            <a:lstStyle/>
+            <a:p>
+              <a:r>
+                <a:rPr lang="en-US" sz="1400" i="1" dirty="0">
+                  <a:latin typeface="Times New Roman" panose="02020603050405020304" pitchFamily="18" charset="0"/>
+                  <a:cs typeface="Times New Roman" panose="02020603050405020304" pitchFamily="18" charset="0"/>
+                </a:rPr>
+                <a:t>7</a:t>
+              </a:r>
+            </a:p>
+          </p:txBody>
+        </p:sp>
+      </p:grpSp>
+      <p:grpSp>
+        <p:nvGrpSpPr>
+          <p:cNvPr id="114" name="Group 113">
+            <a:extLst>
+              <a:ext uri="{FF2B5EF4-FFF2-40B4-BE49-F238E27FC236}">
+                <a16:creationId xmlns:a16="http://schemas.microsoft.com/office/drawing/2014/main" id="{9DDF66AE-FA0E-4B62-B591-F68F24F6E265}"/>
+              </a:ext>
+            </a:extLst>
+          </p:cNvPr>
+          <p:cNvGrpSpPr/>
+          <p:nvPr/>
+        </p:nvGrpSpPr>
+        <p:grpSpPr>
+          <a:xfrm>
+            <a:off x="126004" y="1298133"/>
+            <a:ext cx="444253" cy="572381"/>
+            <a:chOff x="1507986" y="361574"/>
+            <a:chExt cx="444253" cy="572381"/>
+          </a:xfrm>
+        </p:grpSpPr>
+        <p:sp>
+          <p:nvSpPr>
+            <p:cNvPr id="115" name="TextBox 114">
+              <a:extLst>
+                <a:ext uri="{FF2B5EF4-FFF2-40B4-BE49-F238E27FC236}">
+                  <a16:creationId xmlns:a16="http://schemas.microsoft.com/office/drawing/2014/main" id="{A1F8FCEA-B667-4A01-BDBC-581A3D44AA7F}"/>
+                </a:ext>
+              </a:extLst>
+            </p:cNvPr>
+            <p:cNvSpPr txBox="1"/>
+            <p:nvPr/>
+          </p:nvSpPr>
+          <p:spPr>
+            <a:xfrm>
+              <a:off x="1507986" y="361574"/>
+              <a:ext cx="370614" cy="523220"/>
+            </a:xfrm>
+            <a:prstGeom prst="rect">
+              <a:avLst/>
+            </a:prstGeom>
+            <a:noFill/>
+          </p:spPr>
+          <p:txBody>
+            <a:bodyPr wrap="none" rtlCol="0">
+              <a:spAutoFit/>
+            </a:bodyPr>
+            <a:lstStyle/>
+            <a:p>
+              <a:r>
+                <a:rPr lang="en-US" sz="2800" i="1" dirty="0">
+                  <a:latin typeface="Century Schoolbook" panose="02040604050505020304" pitchFamily="18" charset="0"/>
+                  <a:cs typeface="Times New Roman" panose="02020603050405020304" pitchFamily="18" charset="0"/>
+                </a:rPr>
+                <a:t>v</a:t>
+              </a:r>
+              <a:endParaRPr lang="en-US" sz="2800" i="1" dirty="0">
+                <a:latin typeface="Times New Roman" panose="02020603050405020304" pitchFamily="18" charset="0"/>
+                <a:cs typeface="Times New Roman" panose="02020603050405020304" pitchFamily="18" charset="0"/>
+              </a:endParaRPr>
+            </a:p>
+          </p:txBody>
+        </p:sp>
+        <p:sp>
+          <p:nvSpPr>
+            <p:cNvPr id="117" name="TextBox 116">
+              <a:extLst>
+                <a:ext uri="{FF2B5EF4-FFF2-40B4-BE49-F238E27FC236}">
+                  <a16:creationId xmlns:a16="http://schemas.microsoft.com/office/drawing/2014/main" id="{C2E98922-7689-4DDC-BEB1-3926047F46A3}"/>
+                </a:ext>
+              </a:extLst>
+            </p:cNvPr>
+            <p:cNvSpPr txBox="1"/>
+            <p:nvPr/>
+          </p:nvSpPr>
+          <p:spPr>
+            <a:xfrm>
+              <a:off x="1658694" y="622067"/>
+              <a:ext cx="293545" cy="311888"/>
+            </a:xfrm>
+            <a:prstGeom prst="rect">
+              <a:avLst/>
+            </a:prstGeom>
+            <a:noFill/>
+          </p:spPr>
+          <p:txBody>
+            <a:bodyPr wrap="square" rtlCol="0">
+              <a:spAutoFit/>
+            </a:bodyPr>
+            <a:lstStyle/>
+            <a:p>
+              <a:r>
+                <a:rPr lang="en-US" sz="1400" i="1" dirty="0">
+                  <a:latin typeface="Times New Roman" panose="02020603050405020304" pitchFamily="18" charset="0"/>
+                  <a:cs typeface="Times New Roman" panose="02020603050405020304" pitchFamily="18" charset="0"/>
+                </a:rPr>
+                <a:t>5</a:t>
+              </a:r>
+            </a:p>
+          </p:txBody>
+        </p:sp>
+      </p:grpSp>
+      <p:grpSp>
+        <p:nvGrpSpPr>
+          <p:cNvPr id="119" name="Group 118">
+            <a:extLst>
+              <a:ext uri="{FF2B5EF4-FFF2-40B4-BE49-F238E27FC236}">
+                <a16:creationId xmlns:a16="http://schemas.microsoft.com/office/drawing/2014/main" id="{E9173B10-0FF8-4BA7-A59F-0C98277DB184}"/>
+              </a:ext>
+            </a:extLst>
+          </p:cNvPr>
+          <p:cNvGrpSpPr/>
+          <p:nvPr/>
+        </p:nvGrpSpPr>
+        <p:grpSpPr>
+          <a:xfrm>
+            <a:off x="8964838" y="1179373"/>
+            <a:ext cx="1004063" cy="528954"/>
+            <a:chOff x="4761992" y="3977386"/>
+            <a:chExt cx="1004063" cy="528954"/>
+          </a:xfrm>
+        </p:grpSpPr>
+        <p:sp>
+          <p:nvSpPr>
+            <p:cNvPr id="124" name="TextBox 123">
+              <a:extLst>
+                <a:ext uri="{FF2B5EF4-FFF2-40B4-BE49-F238E27FC236}">
+                  <a16:creationId xmlns:a16="http://schemas.microsoft.com/office/drawing/2014/main" id="{66D65CAD-ADDE-47E3-9BDB-4FB8711F7BE1}"/>
+                </a:ext>
+              </a:extLst>
+            </p:cNvPr>
+            <p:cNvSpPr txBox="1"/>
+            <p:nvPr/>
+          </p:nvSpPr>
+          <p:spPr>
+            <a:xfrm>
+              <a:off x="4761992" y="3977386"/>
+              <a:ext cx="1004063" cy="461665"/>
+            </a:xfrm>
+            <a:prstGeom prst="rect">
+              <a:avLst/>
+            </a:prstGeom>
+            <a:noFill/>
+          </p:spPr>
+          <p:txBody>
+            <a:bodyPr wrap="square" rtlCol="0">
+              <a:spAutoFit/>
+            </a:bodyPr>
+            <a:lstStyle/>
+            <a:p>
+              <a:r>
+                <a:rPr lang="en-US" sz="2400" i="1" dirty="0">
+                  <a:latin typeface="Century Schoolbook" panose="02040604050505020304" pitchFamily="18" charset="0"/>
+                  <a:cs typeface="Times New Roman" panose="02020603050405020304" pitchFamily="18" charset="0"/>
+                </a:rPr>
+                <a:t>v</a:t>
+              </a:r>
+              <a:endParaRPr lang="en-US" i="1" dirty="0">
+                <a:latin typeface="Century Schoolbook" panose="02040604050505020304" pitchFamily="18" charset="0"/>
+                <a:cs typeface="Times New Roman" panose="02020603050405020304" pitchFamily="18" charset="0"/>
+              </a:endParaRPr>
+            </a:p>
+          </p:txBody>
+        </p:sp>
+        <p:sp>
+          <p:nvSpPr>
+            <p:cNvPr id="126" name="TextBox 125">
+              <a:extLst>
+                <a:ext uri="{FF2B5EF4-FFF2-40B4-BE49-F238E27FC236}">
+                  <a16:creationId xmlns:a16="http://schemas.microsoft.com/office/drawing/2014/main" id="{0991C466-0741-46B9-9CF2-C28B8A3441B0}"/>
+                </a:ext>
+              </a:extLst>
+            </p:cNvPr>
+            <p:cNvSpPr txBox="1"/>
+            <p:nvPr/>
+          </p:nvSpPr>
+          <p:spPr>
+            <a:xfrm>
+              <a:off x="4890385" y="4137008"/>
+              <a:ext cx="584200" cy="369332"/>
+            </a:xfrm>
+            <a:prstGeom prst="rect">
+              <a:avLst/>
+            </a:prstGeom>
+            <a:noFill/>
+          </p:spPr>
+          <p:txBody>
+            <a:bodyPr wrap="square">
+              <a:spAutoFit/>
+            </a:bodyPr>
+            <a:lstStyle/>
+            <a:p>
+              <a:r>
+                <a:rPr lang="en-US" sz="1800" i="1" dirty="0" err="1">
+                  <a:latin typeface="Times New Roman" panose="02020603050405020304" pitchFamily="18" charset="0"/>
+                  <a:cs typeface="Times New Roman" panose="02020603050405020304" pitchFamily="18" charset="0"/>
+                </a:rPr>
+                <a:t>ctx</a:t>
+              </a:r>
+              <a:endParaRPr lang="en-US" dirty="0"/>
+            </a:p>
+          </p:txBody>
+        </p:sp>
+      </p:grpSp>
+      <p:sp>
+        <p:nvSpPr>
+          <p:cNvPr id="127" name="TextBox 126">
+            <a:extLst>
+              <a:ext uri="{FF2B5EF4-FFF2-40B4-BE49-F238E27FC236}">
+                <a16:creationId xmlns:a16="http://schemas.microsoft.com/office/drawing/2014/main" id="{1B9F99E9-4831-4206-A298-3B42FD2D32E6}"/>
+              </a:ext>
+            </a:extLst>
+          </p:cNvPr>
+          <p:cNvSpPr txBox="1"/>
+          <p:nvPr/>
+        </p:nvSpPr>
+        <p:spPr>
+          <a:xfrm>
+            <a:off x="9576009" y="1284611"/>
+            <a:ext cx="553806" cy="369332"/>
+          </a:xfrm>
+          <a:prstGeom prst="rect">
+            <a:avLst/>
+          </a:prstGeom>
+          <a:noFill/>
+        </p:spPr>
+        <p:txBody>
+          <a:bodyPr wrap="square">
+            <a:spAutoFit/>
+          </a:bodyPr>
+          <a:lstStyle/>
+          <a:p>
+            <a:pPr algn="ctr"/>
+            <a:r>
+              <a:rPr lang="en-US" sz="1800" dirty="0">
+                <a:solidFill>
+                  <a:schemeClr val="accent6">
+                    <a:lumMod val="75000"/>
+                  </a:schemeClr>
+                </a:solidFill>
+              </a:rPr>
+              <a:t>V6</a:t>
+            </a:r>
+          </a:p>
+        </p:txBody>
+      </p:sp>
+      <p:sp>
+        <p:nvSpPr>
+          <p:cNvPr id="128" name="TextBox 127">
+            <a:extLst>
+              <a:ext uri="{FF2B5EF4-FFF2-40B4-BE49-F238E27FC236}">
+                <a16:creationId xmlns:a16="http://schemas.microsoft.com/office/drawing/2014/main" id="{09E67B08-F389-4038-8104-7D87B9D12F2F}"/>
+              </a:ext>
+            </a:extLst>
+          </p:cNvPr>
+          <p:cNvSpPr txBox="1"/>
+          <p:nvPr/>
+        </p:nvSpPr>
+        <p:spPr>
+          <a:xfrm>
+            <a:off x="9393655" y="1288842"/>
+            <a:ext cx="387856" cy="369332"/>
+          </a:xfrm>
+          <a:prstGeom prst="rect">
+            <a:avLst/>
+          </a:prstGeom>
+          <a:noFill/>
+        </p:spPr>
+        <p:txBody>
+          <a:bodyPr wrap="square">
+            <a:spAutoFit/>
+          </a:bodyPr>
+          <a:lstStyle/>
+          <a:p>
+            <a:pPr algn="ctr"/>
+            <a:r>
+              <a:rPr lang="en-US" sz="1800" dirty="0"/>
+              <a:t>x</a:t>
+            </a:r>
+          </a:p>
+        </p:txBody>
+      </p:sp>
+      <p:grpSp>
+        <p:nvGrpSpPr>
+          <p:cNvPr id="17" name="Group 16">
+            <a:extLst>
+              <a:ext uri="{FF2B5EF4-FFF2-40B4-BE49-F238E27FC236}">
+                <a16:creationId xmlns:a16="http://schemas.microsoft.com/office/drawing/2014/main" id="{A84B0886-7241-4143-A91B-EB838C9E93D8}"/>
+              </a:ext>
+            </a:extLst>
+          </p:cNvPr>
+          <p:cNvGrpSpPr/>
+          <p:nvPr/>
+        </p:nvGrpSpPr>
+        <p:grpSpPr>
+          <a:xfrm>
+            <a:off x="9739341" y="1910793"/>
+            <a:ext cx="553806" cy="442175"/>
+            <a:chOff x="7569916" y="3846044"/>
+            <a:chExt cx="553806" cy="442175"/>
+          </a:xfrm>
+        </p:grpSpPr>
+        <p:sp>
+          <p:nvSpPr>
+            <p:cNvPr id="129" name="TextBox 128">
+              <a:extLst>
+                <a:ext uri="{FF2B5EF4-FFF2-40B4-BE49-F238E27FC236}">
+                  <a16:creationId xmlns:a16="http://schemas.microsoft.com/office/drawing/2014/main" id="{5899F48B-EBC2-42F2-A63C-68D9131DDE9B}"/>
+                </a:ext>
+              </a:extLst>
+            </p:cNvPr>
+            <p:cNvSpPr txBox="1"/>
+            <p:nvPr/>
+          </p:nvSpPr>
+          <p:spPr>
+            <a:xfrm>
+              <a:off x="7569916" y="3846044"/>
+              <a:ext cx="553806" cy="369332"/>
+            </a:xfrm>
+            <a:prstGeom prst="rect">
+              <a:avLst/>
+            </a:prstGeom>
+            <a:noFill/>
+          </p:spPr>
+          <p:txBody>
+            <a:bodyPr wrap="square">
+              <a:spAutoFit/>
+            </a:bodyPr>
+            <a:lstStyle/>
+            <a:p>
+              <a:pPr algn="ctr"/>
+              <a:r>
+                <a:rPr lang="en-US" sz="1800" dirty="0">
+                  <a:solidFill>
+                    <a:schemeClr val="accent6">
+                      <a:lumMod val="75000"/>
+                    </a:schemeClr>
+                  </a:solidFill>
+                </a:rPr>
+                <a:t>V*</a:t>
+              </a:r>
+            </a:p>
+          </p:txBody>
+        </p:sp>
+        <p:sp>
+          <p:nvSpPr>
+            <p:cNvPr id="131" name="TextBox 130">
+              <a:extLst>
+                <a:ext uri="{FF2B5EF4-FFF2-40B4-BE49-F238E27FC236}">
+                  <a16:creationId xmlns:a16="http://schemas.microsoft.com/office/drawing/2014/main" id="{83296D4C-BE0A-49A2-8FAC-757B6949E316}"/>
+                </a:ext>
+              </a:extLst>
+            </p:cNvPr>
+            <p:cNvSpPr txBox="1"/>
+            <p:nvPr/>
+          </p:nvSpPr>
+          <p:spPr>
+            <a:xfrm>
+              <a:off x="7741841" y="3980557"/>
+              <a:ext cx="250836" cy="307662"/>
+            </a:xfrm>
+            <a:prstGeom prst="rect">
+              <a:avLst/>
+            </a:prstGeom>
+            <a:noFill/>
+          </p:spPr>
+          <p:txBody>
+            <a:bodyPr wrap="square" rtlCol="0">
+              <a:spAutoFit/>
+            </a:bodyPr>
+            <a:lstStyle/>
+            <a:p>
+              <a:r>
+                <a:rPr lang="en-US" sz="1400" b="1" i="1" dirty="0">
+                  <a:solidFill>
+                    <a:schemeClr val="accent6">
+                      <a:lumMod val="75000"/>
+                    </a:schemeClr>
+                  </a:solidFill>
+                  <a:latin typeface="Times New Roman" panose="02020603050405020304" pitchFamily="18" charset="0"/>
+                  <a:cs typeface="Times New Roman" panose="02020603050405020304" pitchFamily="18" charset="0"/>
+                </a:rPr>
+                <a:t>6</a:t>
+              </a:r>
             </a:p>
           </p:txBody>
         </p:sp>

</xml_diff>

<commit_message>
caption of t-SNE figure
</commit_message>
<xml_diff>
--- a/figures/Figures-Yi.pptx
+++ b/figures/Figures-Yi.pptx
@@ -12,6 +12,7 @@
     <p:sldId id="260" r:id="rId6"/>
     <p:sldId id="261" r:id="rId7"/>
     <p:sldId id="262" r:id="rId8"/>
+    <p:sldId id="263" r:id="rId9"/>
   </p:sldIdLst>
   <p:sldSz cx="12192000" cy="6858000"/>
   <p:notesSz cx="6858000" cy="9144000"/>
@@ -116,6 +117,1902 @@
     </p:ext>
   </p:extLst>
 </p:presentation>
+</file>
+
+<file path=ppt/charts/chart1.xml><?xml version="1.0" encoding="utf-8"?>
+<c:chartSpace xmlns:c="http://schemas.openxmlformats.org/drawingml/2006/chart" xmlns:a="http://schemas.openxmlformats.org/drawingml/2006/main" xmlns:r="http://schemas.openxmlformats.org/officeDocument/2006/relationships" xmlns:c16r2="http://schemas.microsoft.com/office/drawing/2015/06/chart">
+  <c:date1904 val="0"/>
+  <c:lang val="en-US"/>
+  <c:roundedCorners val="0"/>
+  <mc:AlternateContent xmlns:mc="http://schemas.openxmlformats.org/markup-compatibility/2006">
+    <mc:Choice xmlns:c14="http://schemas.microsoft.com/office/drawing/2007/8/2/chart" Requires="c14">
+      <c14:style val="102"/>
+    </mc:Choice>
+    <mc:Fallback>
+      <c:style val="2"/>
+    </mc:Fallback>
+  </mc:AlternateContent>
+  <c:chart>
+    <c:autoTitleDeleted val="1"/>
+    <c:plotArea>
+      <c:layout/>
+      <c:lineChart>
+        <c:grouping val="standard"/>
+        <c:varyColors val="0"/>
+        <c:ser>
+          <c:idx val="0"/>
+          <c:order val="0"/>
+          <c:tx>
+            <c:strRef>
+              <c:f>Sheet1!$C$1</c:f>
+              <c:strCache>
+                <c:ptCount val="1"/>
+                <c:pt idx="0">
+                  <c:v>acc</c:v>
+                </c:pt>
+              </c:strCache>
+            </c:strRef>
+          </c:tx>
+          <c:spPr>
+            <a:ln w="28575" cap="rnd">
+              <a:solidFill>
+                <a:schemeClr val="accent1"/>
+              </a:solidFill>
+              <a:round/>
+            </a:ln>
+            <a:effectLst/>
+          </c:spPr>
+          <c:marker>
+            <c:symbol val="none"/>
+          </c:marker>
+          <c:cat>
+            <c:numRef>
+              <c:f>Sheet1!$A$2:$A$166</c:f>
+              <c:numCache>
+                <c:formatCode>General</c:formatCode>
+                <c:ptCount val="165"/>
+                <c:pt idx="0">
+                  <c:v>1</c:v>
+                </c:pt>
+                <c:pt idx="1">
+                  <c:v>3</c:v>
+                </c:pt>
+                <c:pt idx="2">
+                  <c:v>5</c:v>
+                </c:pt>
+                <c:pt idx="3">
+                  <c:v>6</c:v>
+                </c:pt>
+                <c:pt idx="4">
+                  <c:v>7</c:v>
+                </c:pt>
+                <c:pt idx="5">
+                  <c:v>8</c:v>
+                </c:pt>
+                <c:pt idx="6">
+                  <c:v>9</c:v>
+                </c:pt>
+                <c:pt idx="7">
+                  <c:v>12</c:v>
+                </c:pt>
+                <c:pt idx="8">
+                  <c:v>13</c:v>
+                </c:pt>
+                <c:pt idx="9">
+                  <c:v>15</c:v>
+                </c:pt>
+                <c:pt idx="10">
+                  <c:v>16</c:v>
+                </c:pt>
+                <c:pt idx="11">
+                  <c:v>17</c:v>
+                </c:pt>
+                <c:pt idx="12">
+                  <c:v>18</c:v>
+                </c:pt>
+                <c:pt idx="13">
+                  <c:v>19</c:v>
+                </c:pt>
+                <c:pt idx="14">
+                  <c:v>21</c:v>
+                </c:pt>
+                <c:pt idx="15">
+                  <c:v>22</c:v>
+                </c:pt>
+                <c:pt idx="16">
+                  <c:v>24</c:v>
+                </c:pt>
+                <c:pt idx="17">
+                  <c:v>25</c:v>
+                </c:pt>
+                <c:pt idx="18">
+                  <c:v>26</c:v>
+                </c:pt>
+                <c:pt idx="19">
+                  <c:v>27</c:v>
+                </c:pt>
+                <c:pt idx="20">
+                  <c:v>29</c:v>
+                </c:pt>
+                <c:pt idx="21">
+                  <c:v>30</c:v>
+                </c:pt>
+                <c:pt idx="22">
+                  <c:v>31</c:v>
+                </c:pt>
+                <c:pt idx="23">
+                  <c:v>34</c:v>
+                </c:pt>
+                <c:pt idx="24">
+                  <c:v>35</c:v>
+                </c:pt>
+                <c:pt idx="25">
+                  <c:v>37</c:v>
+                </c:pt>
+                <c:pt idx="26">
+                  <c:v>38</c:v>
+                </c:pt>
+                <c:pt idx="27">
+                  <c:v>39</c:v>
+                </c:pt>
+                <c:pt idx="28">
+                  <c:v>41</c:v>
+                </c:pt>
+                <c:pt idx="29">
+                  <c:v>43</c:v>
+                </c:pt>
+                <c:pt idx="30">
+                  <c:v>45</c:v>
+                </c:pt>
+                <c:pt idx="31">
+                  <c:v>47</c:v>
+                </c:pt>
+                <c:pt idx="32">
+                  <c:v>48</c:v>
+                </c:pt>
+                <c:pt idx="33">
+                  <c:v>49</c:v>
+                </c:pt>
+                <c:pt idx="34">
+                  <c:v>50</c:v>
+                </c:pt>
+                <c:pt idx="35">
+                  <c:v>51</c:v>
+                </c:pt>
+                <c:pt idx="36">
+                  <c:v>54</c:v>
+                </c:pt>
+                <c:pt idx="37">
+                  <c:v>58</c:v>
+                </c:pt>
+                <c:pt idx="38">
+                  <c:v>60</c:v>
+                </c:pt>
+                <c:pt idx="39">
+                  <c:v>62</c:v>
+                </c:pt>
+                <c:pt idx="40">
+                  <c:v>63</c:v>
+                </c:pt>
+                <c:pt idx="41">
+                  <c:v>64</c:v>
+                </c:pt>
+                <c:pt idx="42">
+                  <c:v>68</c:v>
+                </c:pt>
+                <c:pt idx="43">
+                  <c:v>70</c:v>
+                </c:pt>
+                <c:pt idx="44">
+                  <c:v>73</c:v>
+                </c:pt>
+                <c:pt idx="45">
+                  <c:v>74</c:v>
+                </c:pt>
+                <c:pt idx="46">
+                  <c:v>75</c:v>
+                </c:pt>
+                <c:pt idx="47">
+                  <c:v>76</c:v>
+                </c:pt>
+                <c:pt idx="48">
+                  <c:v>79</c:v>
+                </c:pt>
+                <c:pt idx="49">
+                  <c:v>80</c:v>
+                </c:pt>
+                <c:pt idx="50">
+                  <c:v>82</c:v>
+                </c:pt>
+                <c:pt idx="51">
+                  <c:v>86</c:v>
+                </c:pt>
+                <c:pt idx="52">
+                  <c:v>87</c:v>
+                </c:pt>
+                <c:pt idx="53">
+                  <c:v>89</c:v>
+                </c:pt>
+                <c:pt idx="54">
+                  <c:v>90</c:v>
+                </c:pt>
+                <c:pt idx="55">
+                  <c:v>94</c:v>
+                </c:pt>
+                <c:pt idx="56">
+                  <c:v>96</c:v>
+                </c:pt>
+                <c:pt idx="57">
+                  <c:v>97</c:v>
+                </c:pt>
+                <c:pt idx="58">
+                  <c:v>102</c:v>
+                </c:pt>
+                <c:pt idx="59">
+                  <c:v>103</c:v>
+                </c:pt>
+                <c:pt idx="60">
+                  <c:v>105</c:v>
+                </c:pt>
+                <c:pt idx="61">
+                  <c:v>107</c:v>
+                </c:pt>
+                <c:pt idx="62">
+                  <c:v>108</c:v>
+                </c:pt>
+                <c:pt idx="63">
+                  <c:v>115</c:v>
+                </c:pt>
+                <c:pt idx="64">
+                  <c:v>121</c:v>
+                </c:pt>
+                <c:pt idx="65">
+                  <c:v>124</c:v>
+                </c:pt>
+                <c:pt idx="66">
+                  <c:v>130</c:v>
+                </c:pt>
+                <c:pt idx="67">
+                  <c:v>133</c:v>
+                </c:pt>
+                <c:pt idx="68">
+                  <c:v>139</c:v>
+                </c:pt>
+                <c:pt idx="69">
+                  <c:v>142</c:v>
+                </c:pt>
+                <c:pt idx="70">
+                  <c:v>143</c:v>
+                </c:pt>
+                <c:pt idx="71">
+                  <c:v>152</c:v>
+                </c:pt>
+                <c:pt idx="72">
+                  <c:v>154</c:v>
+                </c:pt>
+                <c:pt idx="73">
+                  <c:v>159</c:v>
+                </c:pt>
+                <c:pt idx="74">
+                  <c:v>163</c:v>
+                </c:pt>
+                <c:pt idx="75">
+                  <c:v>169</c:v>
+                </c:pt>
+                <c:pt idx="76">
+                  <c:v>171</c:v>
+                </c:pt>
+                <c:pt idx="77">
+                  <c:v>175</c:v>
+                </c:pt>
+                <c:pt idx="78">
+                  <c:v>188</c:v>
+                </c:pt>
+                <c:pt idx="79">
+                  <c:v>190</c:v>
+                </c:pt>
+                <c:pt idx="80">
+                  <c:v>193</c:v>
+                </c:pt>
+                <c:pt idx="81">
+                  <c:v>195</c:v>
+                </c:pt>
+                <c:pt idx="82">
+                  <c:v>196</c:v>
+                </c:pt>
+                <c:pt idx="83">
+                  <c:v>212</c:v>
+                </c:pt>
+                <c:pt idx="84">
+                  <c:v>213</c:v>
+                </c:pt>
+                <c:pt idx="85">
+                  <c:v>214</c:v>
+                </c:pt>
+                <c:pt idx="86">
+                  <c:v>215</c:v>
+                </c:pt>
+                <c:pt idx="87">
+                  <c:v>216</c:v>
+                </c:pt>
+                <c:pt idx="88">
+                  <c:v>218</c:v>
+                </c:pt>
+                <c:pt idx="89">
+                  <c:v>220</c:v>
+                </c:pt>
+                <c:pt idx="90">
+                  <c:v>221</c:v>
+                </c:pt>
+                <c:pt idx="91">
+                  <c:v>222</c:v>
+                </c:pt>
+                <c:pt idx="92">
+                  <c:v>229</c:v>
+                </c:pt>
+                <c:pt idx="93">
+                  <c:v>246</c:v>
+                </c:pt>
+                <c:pt idx="94">
+                  <c:v>263</c:v>
+                </c:pt>
+                <c:pt idx="95">
+                  <c:v>269</c:v>
+                </c:pt>
+                <c:pt idx="96">
+                  <c:v>276</c:v>
+                </c:pt>
+                <c:pt idx="97">
+                  <c:v>281</c:v>
+                </c:pt>
+                <c:pt idx="98">
+                  <c:v>282</c:v>
+                </c:pt>
+                <c:pt idx="99">
+                  <c:v>283</c:v>
+                </c:pt>
+                <c:pt idx="100">
+                  <c:v>286</c:v>
+                </c:pt>
+                <c:pt idx="101">
+                  <c:v>296</c:v>
+                </c:pt>
+                <c:pt idx="102">
+                  <c:v>305</c:v>
+                </c:pt>
+                <c:pt idx="103">
+                  <c:v>306</c:v>
+                </c:pt>
+                <c:pt idx="104">
+                  <c:v>308</c:v>
+                </c:pt>
+                <c:pt idx="105">
+                  <c:v>309</c:v>
+                </c:pt>
+                <c:pt idx="106">
+                  <c:v>310</c:v>
+                </c:pt>
+                <c:pt idx="107">
+                  <c:v>311</c:v>
+                </c:pt>
+                <c:pt idx="108">
+                  <c:v>322</c:v>
+                </c:pt>
+                <c:pt idx="109">
+                  <c:v>325</c:v>
+                </c:pt>
+                <c:pt idx="110">
+                  <c:v>327</c:v>
+                </c:pt>
+                <c:pt idx="111">
+                  <c:v>335</c:v>
+                </c:pt>
+                <c:pt idx="112">
+                  <c:v>336</c:v>
+                </c:pt>
+                <c:pt idx="113">
+                  <c:v>346</c:v>
+                </c:pt>
+                <c:pt idx="114">
+                  <c:v>353</c:v>
+                </c:pt>
+                <c:pt idx="115">
+                  <c:v>365</c:v>
+                </c:pt>
+                <c:pt idx="116">
+                  <c:v>369</c:v>
+                </c:pt>
+                <c:pt idx="117">
+                  <c:v>382</c:v>
+                </c:pt>
+                <c:pt idx="118">
+                  <c:v>386</c:v>
+                </c:pt>
+                <c:pt idx="119">
+                  <c:v>405</c:v>
+                </c:pt>
+                <c:pt idx="120">
+                  <c:v>428</c:v>
+                </c:pt>
+                <c:pt idx="121">
+                  <c:v>441</c:v>
+                </c:pt>
+                <c:pt idx="122">
+                  <c:v>481</c:v>
+                </c:pt>
+                <c:pt idx="123">
+                  <c:v>501</c:v>
+                </c:pt>
+                <c:pt idx="124">
+                  <c:v>510</c:v>
+                </c:pt>
+                <c:pt idx="125">
+                  <c:v>515</c:v>
+                </c:pt>
+                <c:pt idx="126">
+                  <c:v>518</c:v>
+                </c:pt>
+                <c:pt idx="127">
+                  <c:v>525</c:v>
+                </c:pt>
+                <c:pt idx="128">
+                  <c:v>544</c:v>
+                </c:pt>
+                <c:pt idx="129">
+                  <c:v>551</c:v>
+                </c:pt>
+                <c:pt idx="130">
+                  <c:v>612</c:v>
+                </c:pt>
+                <c:pt idx="131">
+                  <c:v>672</c:v>
+                </c:pt>
+                <c:pt idx="132">
+                  <c:v>693</c:v>
+                </c:pt>
+                <c:pt idx="133">
+                  <c:v>717</c:v>
+                </c:pt>
+                <c:pt idx="134">
+                  <c:v>782</c:v>
+                </c:pt>
+                <c:pt idx="135">
+                  <c:v>828</c:v>
+                </c:pt>
+                <c:pt idx="136">
+                  <c:v>876</c:v>
+                </c:pt>
+                <c:pt idx="137">
+                  <c:v>934</c:v>
+                </c:pt>
+                <c:pt idx="138">
+                  <c:v>935</c:v>
+                </c:pt>
+                <c:pt idx="139">
+                  <c:v>998</c:v>
+                </c:pt>
+                <c:pt idx="140">
+                  <c:v>1015</c:v>
+                </c:pt>
+                <c:pt idx="141">
+                  <c:v>1024</c:v>
+                </c:pt>
+                <c:pt idx="142">
+                  <c:v>1043</c:v>
+                </c:pt>
+                <c:pt idx="143">
+                  <c:v>1068</c:v>
+                </c:pt>
+                <c:pt idx="144">
+                  <c:v>1254</c:v>
+                </c:pt>
+                <c:pt idx="145">
+                  <c:v>1299</c:v>
+                </c:pt>
+                <c:pt idx="146">
+                  <c:v>1305</c:v>
+                </c:pt>
+                <c:pt idx="147">
+                  <c:v>1344</c:v>
+                </c:pt>
+                <c:pt idx="148">
+                  <c:v>1351</c:v>
+                </c:pt>
+                <c:pt idx="149">
+                  <c:v>1352</c:v>
+                </c:pt>
+                <c:pt idx="150">
+                  <c:v>1366</c:v>
+                </c:pt>
+                <c:pt idx="151">
+                  <c:v>1375</c:v>
+                </c:pt>
+                <c:pt idx="152">
+                  <c:v>1447</c:v>
+                </c:pt>
+                <c:pt idx="153">
+                  <c:v>1470</c:v>
+                </c:pt>
+                <c:pt idx="154">
+                  <c:v>1570</c:v>
+                </c:pt>
+                <c:pt idx="155">
+                  <c:v>1572</c:v>
+                </c:pt>
+                <c:pt idx="156">
+                  <c:v>1689</c:v>
+                </c:pt>
+                <c:pt idx="157">
+                  <c:v>1954</c:v>
+                </c:pt>
+                <c:pt idx="158">
+                  <c:v>1956</c:v>
+                </c:pt>
+                <c:pt idx="159">
+                  <c:v>2061</c:v>
+                </c:pt>
+                <c:pt idx="160">
+                  <c:v>2316</c:v>
+                </c:pt>
+                <c:pt idx="161">
+                  <c:v>3365</c:v>
+                </c:pt>
+                <c:pt idx="162">
+                  <c:v>3604</c:v>
+                </c:pt>
+                <c:pt idx="163">
+                  <c:v>7640</c:v>
+                </c:pt>
+              </c:numCache>
+            </c:numRef>
+          </c:cat>
+          <c:val>
+            <c:numRef>
+              <c:f>Sheet1!$C$2:$C$166</c:f>
+              <c:numCache>
+                <c:formatCode>General</c:formatCode>
+                <c:ptCount val="165"/>
+                <c:pt idx="0">
+                  <c:v>0.50981269827866038</c:v>
+                </c:pt>
+                <c:pt idx="1">
+                  <c:v>0.47685753785572738</c:v>
+                </c:pt>
+                <c:pt idx="2">
+                  <c:v>0.47462120537140401</c:v>
+                </c:pt>
+                <c:pt idx="3">
+                  <c:v>0.49051323977541927</c:v>
+                </c:pt>
+                <c:pt idx="4">
+                  <c:v>0.47213819660039652</c:v>
+                </c:pt>
+                <c:pt idx="5">
+                  <c:v>0.47186833942791989</c:v>
+                </c:pt>
+                <c:pt idx="6">
+                  <c:v>0.51728394954216816</c:v>
+                </c:pt>
+                <c:pt idx="7">
+                  <c:v>0.5265911664117805</c:v>
+                </c:pt>
+                <c:pt idx="8">
+                  <c:v>0.50598914717049703</c:v>
+                </c:pt>
+                <c:pt idx="9">
+                  <c:v>0.47249609967607398</c:v>
+                </c:pt>
+                <c:pt idx="10">
+                  <c:v>0.50416863062192896</c:v>
+                </c:pt>
+                <c:pt idx="11">
+                  <c:v>0.52605764686194201</c:v>
+                </c:pt>
+                <c:pt idx="12">
+                  <c:v>0.51335611467811715</c:v>
+                </c:pt>
+                <c:pt idx="13">
+                  <c:v>0.50701149298092163</c:v>
+                </c:pt>
+                <c:pt idx="14">
+                  <c:v>0.47238467989544142</c:v>
+                </c:pt>
+                <c:pt idx="15">
+                  <c:v>0.47699673037359669</c:v>
+                </c:pt>
+                <c:pt idx="16">
+                  <c:v>0.46538468933680011</c:v>
+                </c:pt>
+                <c:pt idx="17">
+                  <c:v>0.46294931649727761</c:v>
+                </c:pt>
+                <c:pt idx="18">
+                  <c:v>0.47909168858473838</c:v>
+                </c:pt>
+                <c:pt idx="19">
+                  <c:v>0.49382003320986151</c:v>
+                </c:pt>
+                <c:pt idx="20">
+                  <c:v>0.50106720450755493</c:v>
+                </c:pt>
+                <c:pt idx="21">
+                  <c:v>0.47971964429542108</c:v>
+                </c:pt>
+                <c:pt idx="22">
+                  <c:v>0.50763421686880006</c:v>
+                </c:pt>
+                <c:pt idx="23">
+                  <c:v>0.50626471674610118</c:v>
+                </c:pt>
+                <c:pt idx="24">
+                  <c:v>0.50097094784221119</c:v>
+                </c:pt>
+                <c:pt idx="25">
+                  <c:v>0.4971296841543707</c:v>
+                </c:pt>
+                <c:pt idx="26">
+                  <c:v>0.50242597002332545</c:v>
+                </c:pt>
+                <c:pt idx="27">
+                  <c:v>0.49910476062335191</c:v>
+                </c:pt>
+                <c:pt idx="28">
+                  <c:v>0.45430190448840718</c:v>
+                </c:pt>
+                <c:pt idx="29">
+                  <c:v>0.47884365819974739</c:v>
+                </c:pt>
+                <c:pt idx="30">
+                  <c:v>0.46819989724499678</c:v>
+                </c:pt>
+                <c:pt idx="31">
+                  <c:v>0.47781905660818558</c:v>
+                </c:pt>
+                <c:pt idx="32">
+                  <c:v>0.453782518380485</c:v>
+                </c:pt>
+                <c:pt idx="33">
+                  <c:v>0.44438439094176152</c:v>
+                </c:pt>
+                <c:pt idx="34">
+                  <c:v>0.474554149321053</c:v>
+                </c:pt>
+                <c:pt idx="35">
+                  <c:v>0.44009980333784399</c:v>
+                </c:pt>
+                <c:pt idx="36">
+                  <c:v>0.44782685888704371</c:v>
+                </c:pt>
+                <c:pt idx="37">
+                  <c:v>0.45039395165817198</c:v>
+                </c:pt>
+                <c:pt idx="38">
+                  <c:v>0.4571346107307363</c:v>
+                </c:pt>
+                <c:pt idx="39">
+                  <c:v>0.47109077674515742</c:v>
+                </c:pt>
+                <c:pt idx="40">
+                  <c:v>0.4508997733861112</c:v>
+                </c:pt>
+                <c:pt idx="41">
+                  <c:v>0.47014224978184382</c:v>
+                </c:pt>
+                <c:pt idx="42">
+                  <c:v>0.44900711444359098</c:v>
+                </c:pt>
+                <c:pt idx="43">
+                  <c:v>0.46094972496825259</c:v>
+                </c:pt>
+                <c:pt idx="44">
+                  <c:v>0.47870888463788402</c:v>
+                </c:pt>
+                <c:pt idx="45">
+                  <c:v>0.47393007434352691</c:v>
+                </c:pt>
+                <c:pt idx="46">
+                  <c:v>0.46487048808391179</c:v>
+                </c:pt>
+                <c:pt idx="47">
+                  <c:v>0.44833509837587388</c:v>
+                </c:pt>
+                <c:pt idx="48">
+                  <c:v>0.46332289179986169</c:v>
+                </c:pt>
+                <c:pt idx="49">
+                  <c:v>0.44603864631485868</c:v>
+                </c:pt>
+                <c:pt idx="50">
+                  <c:v>0.44801583960070612</c:v>
+                </c:pt>
+                <c:pt idx="51">
+                  <c:v>0.43389368628104968</c:v>
+                </c:pt>
+                <c:pt idx="52">
+                  <c:v>0.43724281289661843</c:v>
+                </c:pt>
+                <c:pt idx="53">
+                  <c:v>0.44329639476325178</c:v>
+                </c:pt>
+                <c:pt idx="54">
+                  <c:v>0.4580834217798464</c:v>
+                </c:pt>
+                <c:pt idx="55">
+                  <c:v>0.44625311623973712</c:v>
+                </c:pt>
+                <c:pt idx="56">
+                  <c:v>0.45791423033870171</c:v>
+                </c:pt>
+                <c:pt idx="57">
+                  <c:v>0.45830692548308621</c:v>
+                </c:pt>
+                <c:pt idx="58">
+                  <c:v>0.45233100451098229</c:v>
+                </c:pt>
+                <c:pt idx="59">
+                  <c:v>0.45317497788218197</c:v>
+                </c:pt>
+                <c:pt idx="60">
+                  <c:v>0.45165143309501588</c:v>
+                </c:pt>
+                <c:pt idx="61">
+                  <c:v>0.45898354095965749</c:v>
+                </c:pt>
+                <c:pt idx="62">
+                  <c:v>0.43829166304079598</c:v>
+                </c:pt>
+                <c:pt idx="63">
+                  <c:v>0.43875501614458789</c:v>
+                </c:pt>
+                <c:pt idx="64">
+                  <c:v>0.44498757232409653</c:v>
+                </c:pt>
+                <c:pt idx="65">
+                  <c:v>0.43354549422303262</c:v>
+                </c:pt>
+                <c:pt idx="66">
+                  <c:v>0.4583131564728179</c:v>
+                </c:pt>
+                <c:pt idx="67">
+                  <c:v>0.43564361137459229</c:v>
+                </c:pt>
+                <c:pt idx="68">
+                  <c:v>0.4329690775261778</c:v>
+                </c:pt>
+                <c:pt idx="69">
+                  <c:v>0.44155219002437579</c:v>
+                </c:pt>
+                <c:pt idx="70">
+                  <c:v>0.43670010308492591</c:v>
+                </c:pt>
+                <c:pt idx="71">
+                  <c:v>0.42671873574676572</c:v>
+                </c:pt>
+                <c:pt idx="72">
+                  <c:v>0.43101702913050932</c:v>
+                </c:pt>
+                <c:pt idx="73">
+                  <c:v>0.42972085006670557</c:v>
+                </c:pt>
+                <c:pt idx="74">
+                  <c:v>0.43959121285764408</c:v>
+                </c:pt>
+                <c:pt idx="75">
+                  <c:v>0.42654362732908391</c:v>
+                </c:pt>
+                <c:pt idx="76">
+                  <c:v>0.43935619972144258</c:v>
+                </c:pt>
+                <c:pt idx="77">
+                  <c:v>0.42907815949243983</c:v>
+                </c:pt>
+                <c:pt idx="78">
+                  <c:v>0.41225284093913978</c:v>
+                </c:pt>
+                <c:pt idx="79">
+                  <c:v>0.43886644823144733</c:v>
+                </c:pt>
+                <c:pt idx="80">
+                  <c:v>0.43934707784973348</c:v>
+                </c:pt>
+                <c:pt idx="81">
+                  <c:v>0.41583381946148418</c:v>
+                </c:pt>
+                <c:pt idx="82">
+                  <c:v>0.43786948736798181</c:v>
+                </c:pt>
+                <c:pt idx="83">
+                  <c:v>0.41437976028416912</c:v>
+                </c:pt>
+                <c:pt idx="84">
+                  <c:v>0.43123890296996809</c:v>
+                </c:pt>
+                <c:pt idx="85">
+                  <c:v>0.42364268748112599</c:v>
+                </c:pt>
+                <c:pt idx="86">
+                  <c:v>0.4327681828249475</c:v>
+                </c:pt>
+                <c:pt idx="87">
+                  <c:v>0.41701220097434111</c:v>
+                </c:pt>
+                <c:pt idx="88">
+                  <c:v>0.42043443406187098</c:v>
+                </c:pt>
+                <c:pt idx="89">
+                  <c:v>0.4145091348197284</c:v>
+                </c:pt>
+                <c:pt idx="90">
+                  <c:v>0.41515084221525111</c:v>
+                </c:pt>
+                <c:pt idx="91">
+                  <c:v>0.41912282051572503</c:v>
+                </c:pt>
+                <c:pt idx="92">
+                  <c:v>0.41198192155217123</c:v>
+                </c:pt>
+                <c:pt idx="93">
+                  <c:v>0.41929531027391881</c:v>
+                </c:pt>
+                <c:pt idx="94">
+                  <c:v>0.43252612202309049</c:v>
+                </c:pt>
+                <c:pt idx="95">
+                  <c:v>0.43986415036571669</c:v>
+                </c:pt>
+                <c:pt idx="96">
+                  <c:v>0.43436473154530192</c:v>
+                </c:pt>
+                <c:pt idx="97">
+                  <c:v>0.42866084889216849</c:v>
+                </c:pt>
+                <c:pt idx="98">
+                  <c:v>0.41172984780745758</c:v>
+                </c:pt>
+                <c:pt idx="99">
+                  <c:v>0.43818095612884722</c:v>
+                </c:pt>
+                <c:pt idx="100">
+                  <c:v>0.43803586053426757</c:v>
+                </c:pt>
+                <c:pt idx="101">
+                  <c:v>0.42992816225928188</c:v>
+                </c:pt>
+                <c:pt idx="102">
+                  <c:v>0.41564603207435702</c:v>
+                </c:pt>
+                <c:pt idx="103">
+                  <c:v>0.39254911420609051</c:v>
+                </c:pt>
+                <c:pt idx="104">
+                  <c:v>0.42047690441989422</c:v>
+                </c:pt>
+                <c:pt idx="105">
+                  <c:v>0.40962267505856359</c:v>
+                </c:pt>
+                <c:pt idx="106">
+                  <c:v>0.3988561220742593</c:v>
+                </c:pt>
+                <c:pt idx="107">
+                  <c:v>0.4180548110786319</c:v>
+                </c:pt>
+                <c:pt idx="108">
+                  <c:v>0.39776650256719542</c:v>
+                </c:pt>
+                <c:pt idx="109">
+                  <c:v>0.41079930708911472</c:v>
+                </c:pt>
+                <c:pt idx="110">
+                  <c:v>0.42575970524854362</c:v>
+                </c:pt>
+                <c:pt idx="111">
+                  <c:v>0.40369596454166962</c:v>
+                </c:pt>
+                <c:pt idx="112">
+                  <c:v>0.39428411721852102</c:v>
+                </c:pt>
+                <c:pt idx="113">
+                  <c:v>0.41028540100235977</c:v>
+                </c:pt>
+                <c:pt idx="114">
+                  <c:v>0.41456243527253922</c:v>
+                </c:pt>
+                <c:pt idx="115">
+                  <c:v>0.40048575844710588</c:v>
+                </c:pt>
+                <c:pt idx="116">
+                  <c:v>0.39667765486943318</c:v>
+                </c:pt>
+                <c:pt idx="117">
+                  <c:v>0.39463506951129612</c:v>
+                </c:pt>
+                <c:pt idx="118">
+                  <c:v>0.40121775563365197</c:v>
+                </c:pt>
+                <c:pt idx="119">
+                  <c:v>0.41296996994801299</c:v>
+                </c:pt>
+                <c:pt idx="120">
+                  <c:v>0.41047506093509017</c:v>
+                </c:pt>
+                <c:pt idx="121">
+                  <c:v>0.39366938874340712</c:v>
+                </c:pt>
+                <c:pt idx="122">
+                  <c:v>0.40208454806793731</c:v>
+                </c:pt>
+                <c:pt idx="123">
+                  <c:v>0.41628473380673298</c:v>
+                </c:pt>
+                <c:pt idx="124">
+                  <c:v>0.3990600291973041</c:v>
+                </c:pt>
+                <c:pt idx="125">
+                  <c:v>0.40200899179744592</c:v>
+                </c:pt>
+                <c:pt idx="126">
+                  <c:v>0.40952010692327151</c:v>
+                </c:pt>
+                <c:pt idx="127">
+                  <c:v>0.41536445348777268</c:v>
+                </c:pt>
+                <c:pt idx="128">
+                  <c:v>0.3975591466054606</c:v>
+                </c:pt>
+                <c:pt idx="129">
+                  <c:v>0.41515831043862161</c:v>
+                </c:pt>
+                <c:pt idx="130">
+                  <c:v>0.39668870100016518</c:v>
+                </c:pt>
+                <c:pt idx="131">
+                  <c:v>0.42847031446608053</c:v>
+                </c:pt>
+                <c:pt idx="132">
+                  <c:v>0.41869009389521938</c:v>
+                </c:pt>
+                <c:pt idx="133">
+                  <c:v>0.40747862202553792</c:v>
+                </c:pt>
+                <c:pt idx="134">
+                  <c:v>0.42089407348577978</c:v>
+                </c:pt>
+                <c:pt idx="135">
+                  <c:v>0.42787994814781333</c:v>
+                </c:pt>
+                <c:pt idx="136">
+                  <c:v>0.42423363395438929</c:v>
+                </c:pt>
+                <c:pt idx="137">
+                  <c:v>0.42616233970964512</c:v>
+                </c:pt>
+                <c:pt idx="138">
+                  <c:v>0.42319456316086862</c:v>
+                </c:pt>
+                <c:pt idx="139">
+                  <c:v>0.4099538068799134</c:v>
+                </c:pt>
+                <c:pt idx="140">
+                  <c:v>0.39466190331235018</c:v>
+                </c:pt>
+                <c:pt idx="141">
+                  <c:v>0.39650994110722282</c:v>
+                </c:pt>
+                <c:pt idx="142">
+                  <c:v>0.35703949299768623</c:v>
+                </c:pt>
+                <c:pt idx="143">
+                  <c:v>0.38271308085491529</c:v>
+                </c:pt>
+                <c:pt idx="144">
+                  <c:v>0.39532729689269919</c:v>
+                </c:pt>
+                <c:pt idx="145">
+                  <c:v>0.37420491500523312</c:v>
+                </c:pt>
+                <c:pt idx="146">
+                  <c:v>0.38353822403774718</c:v>
+                </c:pt>
+                <c:pt idx="147">
+                  <c:v>0.3853528734288969</c:v>
+                </c:pt>
+                <c:pt idx="148">
+                  <c:v>0.35230323360631433</c:v>
+                </c:pt>
+                <c:pt idx="149">
+                  <c:v>0.37559424159418642</c:v>
+                </c:pt>
+                <c:pt idx="150">
+                  <c:v>0.36383783617401089</c:v>
+                </c:pt>
+                <c:pt idx="151">
+                  <c:v>0.35293907865818941</c:v>
+                </c:pt>
+                <c:pt idx="152">
+                  <c:v>0.38944940403187789</c:v>
+                </c:pt>
+                <c:pt idx="153">
+                  <c:v>0.35516276851988238</c:v>
+                </c:pt>
+                <c:pt idx="154">
+                  <c:v>0.37055562751701637</c:v>
+                </c:pt>
+                <c:pt idx="155">
+                  <c:v>0.3650545572242439</c:v>
+                </c:pt>
+                <c:pt idx="156">
+                  <c:v>0.37854817400840368</c:v>
+                </c:pt>
+                <c:pt idx="157">
+                  <c:v>0.3557761475595605</c:v>
+                </c:pt>
+                <c:pt idx="158">
+                  <c:v>0.38199905260920602</c:v>
+                </c:pt>
+                <c:pt idx="159">
+                  <c:v>0.3564585623874163</c:v>
+                </c:pt>
+                <c:pt idx="160">
+                  <c:v>0.37025124260937842</c:v>
+                </c:pt>
+                <c:pt idx="161">
+                  <c:v>0.35648450032579171</c:v>
+                </c:pt>
+                <c:pt idx="162">
+                  <c:v>0.37943171288285049</c:v>
+                </c:pt>
+                <c:pt idx="163">
+                  <c:v>0.36147156349141241</c:v>
+                </c:pt>
+              </c:numCache>
+            </c:numRef>
+          </c:val>
+          <c:smooth val="0"/>
+          <c:extLst>
+            <c:ext xmlns:c16="http://schemas.microsoft.com/office/drawing/2014/chart" uri="{C3380CC4-5D6E-409C-BE32-E72D297353CC}">
+              <c16:uniqueId val="{00000000-7655-4204-95BF-3254CB452444}"/>
+            </c:ext>
+          </c:extLst>
+        </c:ser>
+        <c:dLbls>
+          <c:showLegendKey val="0"/>
+          <c:showVal val="0"/>
+          <c:showCatName val="0"/>
+          <c:showSerName val="0"/>
+          <c:showPercent val="0"/>
+          <c:showBubbleSize val="0"/>
+        </c:dLbls>
+        <c:smooth val="0"/>
+        <c:axId val="645800784"/>
+        <c:axId val="645799184"/>
+      </c:lineChart>
+      <c:catAx>
+        <c:axId val="645800784"/>
+        <c:scaling>
+          <c:orientation val="minMax"/>
+        </c:scaling>
+        <c:delete val="0"/>
+        <c:axPos val="b"/>
+        <c:title>
+          <c:tx>
+            <c:rich>
+              <a:bodyPr rot="0" spcFirstLastPara="1" vertOverflow="ellipsis" vert="horz" wrap="square" anchor="ctr" anchorCtr="1"/>
+              <a:lstStyle/>
+              <a:p>
+                <a:pPr>
+                  <a:defRPr sz="1000" b="0" i="0" u="none" strike="noStrike" kern="1200" baseline="0">
+                    <a:solidFill>
+                      <a:schemeClr val="tx1">
+                        <a:lumMod val="65000"/>
+                        <a:lumOff val="35000"/>
+                      </a:schemeClr>
+                    </a:solidFill>
+                    <a:latin typeface="+mn-lt"/>
+                    <a:ea typeface="+mn-ea"/>
+                    <a:cs typeface="+mn-cs"/>
+                  </a:defRPr>
+                </a:pPr>
+                <a:r>
+                  <a:rPr lang="en-US"/>
+                  <a:t>#</a:t>
+                </a:r>
+                <a:r>
+                  <a:rPr lang="en-US" baseline="0"/>
+                  <a:t> stmts</a:t>
+                </a:r>
+                <a:endParaRPr lang="en-US"/>
+              </a:p>
+            </c:rich>
+          </c:tx>
+          <c:layout>
+            <c:manualLayout>
+              <c:xMode val="edge"/>
+              <c:yMode val="edge"/>
+              <c:x val="0.87739795028489176"/>
+              <c:y val="0.7644762045952993"/>
+            </c:manualLayout>
+          </c:layout>
+          <c:overlay val="0"/>
+          <c:spPr>
+            <a:noFill/>
+            <a:ln>
+              <a:noFill/>
+            </a:ln>
+            <a:effectLst/>
+          </c:spPr>
+          <c:txPr>
+            <a:bodyPr rot="0" spcFirstLastPara="1" vertOverflow="ellipsis" vert="horz" wrap="square" anchor="ctr" anchorCtr="1"/>
+            <a:lstStyle/>
+            <a:p>
+              <a:pPr>
+                <a:defRPr sz="1000" b="0" i="0" u="none" strike="noStrike" kern="1200" baseline="0">
+                  <a:solidFill>
+                    <a:schemeClr val="tx1">
+                      <a:lumMod val="65000"/>
+                      <a:lumOff val="35000"/>
+                    </a:schemeClr>
+                  </a:solidFill>
+                  <a:latin typeface="+mn-lt"/>
+                  <a:ea typeface="+mn-ea"/>
+                  <a:cs typeface="+mn-cs"/>
+                </a:defRPr>
+              </a:pPr>
+              <a:endParaRPr lang="en-US"/>
+            </a:p>
+          </c:txPr>
+        </c:title>
+        <c:numFmt formatCode="General" sourceLinked="1"/>
+        <c:majorTickMark val="none"/>
+        <c:minorTickMark val="none"/>
+        <c:tickLblPos val="nextTo"/>
+        <c:spPr>
+          <a:noFill/>
+          <a:ln w="9525" cap="flat" cmpd="sng" algn="ctr">
+            <a:solidFill>
+              <a:schemeClr val="tx1">
+                <a:lumMod val="15000"/>
+                <a:lumOff val="85000"/>
+              </a:schemeClr>
+            </a:solidFill>
+            <a:round/>
+          </a:ln>
+          <a:effectLst/>
+        </c:spPr>
+        <c:txPr>
+          <a:bodyPr rot="-60000000" spcFirstLastPara="1" vertOverflow="ellipsis" vert="horz" wrap="square" anchor="ctr" anchorCtr="1"/>
+          <a:lstStyle/>
+          <a:p>
+            <a:pPr>
+              <a:defRPr sz="900" b="0" i="0" u="none" strike="noStrike" kern="1200" baseline="0">
+                <a:solidFill>
+                  <a:schemeClr val="tx1">
+                    <a:lumMod val="65000"/>
+                    <a:lumOff val="35000"/>
+                  </a:schemeClr>
+                </a:solidFill>
+                <a:latin typeface="+mn-lt"/>
+                <a:ea typeface="+mn-ea"/>
+                <a:cs typeface="+mn-cs"/>
+              </a:defRPr>
+            </a:pPr>
+            <a:endParaRPr lang="en-US"/>
+          </a:p>
+        </c:txPr>
+        <c:crossAx val="645799184"/>
+        <c:crosses val="autoZero"/>
+        <c:auto val="1"/>
+        <c:lblAlgn val="ctr"/>
+        <c:lblOffset val="100"/>
+        <c:tickLblSkip val="15"/>
+        <c:noMultiLvlLbl val="0"/>
+      </c:catAx>
+      <c:valAx>
+        <c:axId val="645799184"/>
+        <c:scaling>
+          <c:orientation val="minMax"/>
+        </c:scaling>
+        <c:delete val="0"/>
+        <c:axPos val="l"/>
+        <c:majorGridlines>
+          <c:spPr>
+            <a:ln w="9525" cap="flat" cmpd="sng" algn="ctr">
+              <a:solidFill>
+                <a:schemeClr val="tx1">
+                  <a:lumMod val="15000"/>
+                  <a:lumOff val="85000"/>
+                </a:schemeClr>
+              </a:solidFill>
+              <a:round/>
+            </a:ln>
+            <a:effectLst/>
+          </c:spPr>
+        </c:majorGridlines>
+        <c:title>
+          <c:tx>
+            <c:rich>
+              <a:bodyPr rot="-5400000" spcFirstLastPara="1" vertOverflow="ellipsis" vert="horz" wrap="square" anchor="ctr" anchorCtr="1"/>
+              <a:lstStyle/>
+              <a:p>
+                <a:pPr>
+                  <a:defRPr sz="1000" b="0" i="0" u="none" strike="noStrike" kern="1200" baseline="0">
+                    <a:solidFill>
+                      <a:schemeClr val="tx1">
+                        <a:lumMod val="65000"/>
+                        <a:lumOff val="35000"/>
+                      </a:schemeClr>
+                    </a:solidFill>
+                    <a:latin typeface="+mn-lt"/>
+                    <a:ea typeface="+mn-ea"/>
+                    <a:cs typeface="+mn-cs"/>
+                  </a:defRPr>
+                </a:pPr>
+                <a:r>
+                  <a:rPr lang="en-US"/>
+                  <a:t>Accuracy</a:t>
+                </a:r>
+              </a:p>
+            </c:rich>
+          </c:tx>
+          <c:overlay val="0"/>
+          <c:spPr>
+            <a:noFill/>
+            <a:ln>
+              <a:noFill/>
+            </a:ln>
+            <a:effectLst/>
+          </c:spPr>
+          <c:txPr>
+            <a:bodyPr rot="-5400000" spcFirstLastPara="1" vertOverflow="ellipsis" vert="horz" wrap="square" anchor="ctr" anchorCtr="1"/>
+            <a:lstStyle/>
+            <a:p>
+              <a:pPr>
+                <a:defRPr sz="1000" b="0" i="0" u="none" strike="noStrike" kern="1200" baseline="0">
+                  <a:solidFill>
+                    <a:schemeClr val="tx1">
+                      <a:lumMod val="65000"/>
+                      <a:lumOff val="35000"/>
+                    </a:schemeClr>
+                  </a:solidFill>
+                  <a:latin typeface="+mn-lt"/>
+                  <a:ea typeface="+mn-ea"/>
+                  <a:cs typeface="+mn-cs"/>
+                </a:defRPr>
+              </a:pPr>
+              <a:endParaRPr lang="en-US"/>
+            </a:p>
+          </c:txPr>
+        </c:title>
+        <c:numFmt formatCode="General" sourceLinked="1"/>
+        <c:majorTickMark val="none"/>
+        <c:minorTickMark val="none"/>
+        <c:tickLblPos val="nextTo"/>
+        <c:spPr>
+          <a:noFill/>
+          <a:ln>
+            <a:noFill/>
+          </a:ln>
+          <a:effectLst/>
+        </c:spPr>
+        <c:txPr>
+          <a:bodyPr rot="-60000000" spcFirstLastPara="1" vertOverflow="ellipsis" vert="horz" wrap="square" anchor="ctr" anchorCtr="1"/>
+          <a:lstStyle/>
+          <a:p>
+            <a:pPr>
+              <a:defRPr sz="900" b="0" i="0" u="none" strike="noStrike" kern="1200" baseline="0">
+                <a:solidFill>
+                  <a:schemeClr val="tx1">
+                    <a:lumMod val="65000"/>
+                    <a:lumOff val="35000"/>
+                  </a:schemeClr>
+                </a:solidFill>
+                <a:latin typeface="+mn-lt"/>
+                <a:ea typeface="+mn-ea"/>
+                <a:cs typeface="+mn-cs"/>
+              </a:defRPr>
+            </a:pPr>
+            <a:endParaRPr lang="en-US"/>
+          </a:p>
+        </c:txPr>
+        <c:crossAx val="645800784"/>
+        <c:crosses val="autoZero"/>
+        <c:crossBetween val="between"/>
+      </c:valAx>
+      <c:spPr>
+        <a:noFill/>
+        <a:ln>
+          <a:noFill/>
+        </a:ln>
+        <a:effectLst/>
+      </c:spPr>
+    </c:plotArea>
+    <c:plotVisOnly val="1"/>
+    <c:dispBlanksAs val="gap"/>
+    <c:extLst>
+      <c:ext xmlns:c16r3="http://schemas.microsoft.com/office/drawing/2017/03/chart" uri="{56B9EC1D-385E-4148-901F-78D8002777C0}">
+        <c16r3:dataDisplayOptions16>
+          <c16r3:dispNaAsBlank val="1"/>
+        </c16r3:dataDisplayOptions16>
+      </c:ext>
+    </c:extLst>
+    <c:showDLblsOverMax val="0"/>
+  </c:chart>
+  <c:spPr>
+    <a:noFill/>
+    <a:ln>
+      <a:noFill/>
+    </a:ln>
+    <a:effectLst/>
+  </c:spPr>
+  <c:txPr>
+    <a:bodyPr/>
+    <a:lstStyle/>
+    <a:p>
+      <a:pPr>
+        <a:defRPr/>
+      </a:pPr>
+      <a:endParaRPr lang="en-US"/>
+    </a:p>
+  </c:txPr>
+  <c:externalData r:id="rId3">
+    <c:autoUpdate val="0"/>
+  </c:externalData>
+</c:chartSpace>
+</file>
+
+<file path=ppt/charts/colors1.xml><?xml version="1.0" encoding="utf-8"?>
+<cs:colorStyle xmlns:cs="http://schemas.microsoft.com/office/drawing/2012/chartStyle" xmlns:a="http://schemas.openxmlformats.org/drawingml/2006/main" meth="cycle" id="10">
+  <a:schemeClr val="accent1"/>
+  <a:schemeClr val="accent2"/>
+  <a:schemeClr val="accent3"/>
+  <a:schemeClr val="accent4"/>
+  <a:schemeClr val="accent5"/>
+  <a:schemeClr val="accent6"/>
+  <cs:variation/>
+  <cs:variation>
+    <a:lumMod val="60000"/>
+  </cs:variation>
+  <cs:variation>
+    <a:lumMod val="80000"/>
+    <a:lumOff val="20000"/>
+  </cs:variation>
+  <cs:variation>
+    <a:lumMod val="80000"/>
+  </cs:variation>
+  <cs:variation>
+    <a:lumMod val="60000"/>
+    <a:lumOff val="40000"/>
+  </cs:variation>
+  <cs:variation>
+    <a:lumMod val="50000"/>
+  </cs:variation>
+  <cs:variation>
+    <a:lumMod val="70000"/>
+    <a:lumOff val="30000"/>
+  </cs:variation>
+  <cs:variation>
+    <a:lumMod val="70000"/>
+  </cs:variation>
+  <cs:variation>
+    <a:lumMod val="50000"/>
+    <a:lumOff val="50000"/>
+  </cs:variation>
+</cs:colorStyle>
+</file>
+
+<file path=ppt/charts/style1.xml><?xml version="1.0" encoding="utf-8"?>
+<cs:chartStyle xmlns:cs="http://schemas.microsoft.com/office/drawing/2012/chartStyle" xmlns:a="http://schemas.openxmlformats.org/drawingml/2006/main" id="227">
+  <cs:axisTitle>
+    <cs:lnRef idx="0"/>
+    <cs:fillRef idx="0"/>
+    <cs:effectRef idx="0"/>
+    <cs:fontRef idx="minor">
+      <a:schemeClr val="tx1">
+        <a:lumMod val="65000"/>
+        <a:lumOff val="35000"/>
+      </a:schemeClr>
+    </cs:fontRef>
+    <cs:defRPr sz="1000" kern="1200"/>
+  </cs:axisTitle>
+  <cs:categoryAxis>
+    <cs:lnRef idx="0"/>
+    <cs:fillRef idx="0"/>
+    <cs:effectRef idx="0"/>
+    <cs:fontRef idx="minor">
+      <a:schemeClr val="tx1">
+        <a:lumMod val="65000"/>
+        <a:lumOff val="35000"/>
+      </a:schemeClr>
+    </cs:fontRef>
+    <cs:spPr>
+      <a:ln w="9525" cap="flat" cmpd="sng" algn="ctr">
+        <a:solidFill>
+          <a:schemeClr val="tx1">
+            <a:lumMod val="15000"/>
+            <a:lumOff val="85000"/>
+          </a:schemeClr>
+        </a:solidFill>
+        <a:round/>
+      </a:ln>
+    </cs:spPr>
+    <cs:defRPr sz="900" kern="1200"/>
+  </cs:categoryAxis>
+  <cs:chartArea mods="allowNoFillOverride allowNoLineOverride">
+    <cs:lnRef idx="0"/>
+    <cs:fillRef idx="0"/>
+    <cs:effectRef idx="0"/>
+    <cs:fontRef idx="minor">
+      <a:schemeClr val="tx1"/>
+    </cs:fontRef>
+    <cs:spPr>
+      <a:solidFill>
+        <a:schemeClr val="bg1"/>
+      </a:solidFill>
+      <a:ln w="9525" cap="flat" cmpd="sng" algn="ctr">
+        <a:solidFill>
+          <a:schemeClr val="tx1">
+            <a:lumMod val="15000"/>
+            <a:lumOff val="85000"/>
+          </a:schemeClr>
+        </a:solidFill>
+        <a:round/>
+      </a:ln>
+    </cs:spPr>
+    <cs:defRPr sz="1000" kern="1200"/>
+  </cs:chartArea>
+  <cs:dataLabel>
+    <cs:lnRef idx="0"/>
+    <cs:fillRef idx="0"/>
+    <cs:effectRef idx="0"/>
+    <cs:fontRef idx="minor">
+      <a:schemeClr val="tx1">
+        <a:lumMod val="75000"/>
+        <a:lumOff val="25000"/>
+      </a:schemeClr>
+    </cs:fontRef>
+    <cs:defRPr sz="900" kern="1200"/>
+  </cs:dataLabel>
+  <cs:dataLabelCallout>
+    <cs:lnRef idx="0"/>
+    <cs:fillRef idx="0"/>
+    <cs:effectRef idx="0"/>
+    <cs:fontRef idx="minor">
+      <a:schemeClr val="dk1">
+        <a:lumMod val="65000"/>
+        <a:lumOff val="35000"/>
+      </a:schemeClr>
+    </cs:fontRef>
+    <cs:spPr>
+      <a:solidFill>
+        <a:schemeClr val="lt1"/>
+      </a:solidFill>
+      <a:ln>
+        <a:solidFill>
+          <a:schemeClr val="dk1">
+            <a:lumMod val="25000"/>
+            <a:lumOff val="75000"/>
+          </a:schemeClr>
+        </a:solidFill>
+      </a:ln>
+    </cs:spPr>
+    <cs:defRPr sz="900" kern="1200"/>
+    <cs:bodyPr rot="0" spcFirstLastPara="1" vertOverflow="clip" horzOverflow="clip" vert="horz" wrap="square" lIns="36576" tIns="18288" rIns="36576" bIns="18288" anchor="ctr" anchorCtr="1">
+      <a:spAutoFit/>
+    </cs:bodyPr>
+  </cs:dataLabelCallout>
+  <cs:dataPoint>
+    <cs:lnRef idx="0"/>
+    <cs:fillRef idx="1">
+      <cs:styleClr val="auto"/>
+    </cs:fillRef>
+    <cs:effectRef idx="0"/>
+    <cs:fontRef idx="minor">
+      <a:schemeClr val="tx1"/>
+    </cs:fontRef>
+    <cs:spPr>
+      <a:solidFill>
+        <a:schemeClr val="phClr"/>
+      </a:solidFill>
+    </cs:spPr>
+  </cs:dataPoint>
+  <cs:dataPoint3D>
+    <cs:lnRef idx="0"/>
+    <cs:fillRef idx="1">
+      <cs:styleClr val="auto"/>
+    </cs:fillRef>
+    <cs:effectRef idx="0"/>
+    <cs:fontRef idx="minor">
+      <a:schemeClr val="tx1"/>
+    </cs:fontRef>
+    <cs:spPr>
+      <a:solidFill>
+        <a:schemeClr val="phClr"/>
+      </a:solidFill>
+    </cs:spPr>
+  </cs:dataPoint3D>
+  <cs:dataPointLine>
+    <cs:lnRef idx="0">
+      <cs:styleClr val="auto"/>
+    </cs:lnRef>
+    <cs:fillRef idx="1"/>
+    <cs:effectRef idx="0"/>
+    <cs:fontRef idx="minor">
+      <a:schemeClr val="tx1"/>
+    </cs:fontRef>
+    <cs:spPr>
+      <a:ln w="28575" cap="rnd">
+        <a:solidFill>
+          <a:schemeClr val="phClr"/>
+        </a:solidFill>
+        <a:round/>
+      </a:ln>
+    </cs:spPr>
+  </cs:dataPointLine>
+  <cs:dataPointMarker>
+    <cs:lnRef idx="0">
+      <cs:styleClr val="auto"/>
+    </cs:lnRef>
+    <cs:fillRef idx="1">
+      <cs:styleClr val="auto"/>
+    </cs:fillRef>
+    <cs:effectRef idx="0"/>
+    <cs:fontRef idx="minor">
+      <a:schemeClr val="tx1"/>
+    </cs:fontRef>
+    <cs:spPr>
+      <a:solidFill>
+        <a:schemeClr val="phClr"/>
+      </a:solidFill>
+      <a:ln w="9525">
+        <a:solidFill>
+          <a:schemeClr val="phClr"/>
+        </a:solidFill>
+      </a:ln>
+    </cs:spPr>
+  </cs:dataPointMarker>
+  <cs:dataPointMarkerLayout symbol="circle" size="5"/>
+  <cs:dataPointWireframe>
+    <cs:lnRef idx="0">
+      <cs:styleClr val="auto"/>
+    </cs:lnRef>
+    <cs:fillRef idx="1"/>
+    <cs:effectRef idx="0"/>
+    <cs:fontRef idx="minor">
+      <a:schemeClr val="tx1"/>
+    </cs:fontRef>
+    <cs:spPr>
+      <a:ln w="9525" cap="rnd">
+        <a:solidFill>
+          <a:schemeClr val="phClr"/>
+        </a:solidFill>
+        <a:round/>
+      </a:ln>
+    </cs:spPr>
+  </cs:dataPointWireframe>
+  <cs:dataTable>
+    <cs:lnRef idx="0"/>
+    <cs:fillRef idx="0"/>
+    <cs:effectRef idx="0"/>
+    <cs:fontRef idx="minor">
+      <a:schemeClr val="tx1">
+        <a:lumMod val="65000"/>
+        <a:lumOff val="35000"/>
+      </a:schemeClr>
+    </cs:fontRef>
+    <cs:spPr>
+      <a:noFill/>
+      <a:ln w="9525" cap="flat" cmpd="sng" algn="ctr">
+        <a:solidFill>
+          <a:schemeClr val="tx1">
+            <a:lumMod val="15000"/>
+            <a:lumOff val="85000"/>
+          </a:schemeClr>
+        </a:solidFill>
+        <a:round/>
+      </a:ln>
+    </cs:spPr>
+    <cs:defRPr sz="900" kern="1200"/>
+  </cs:dataTable>
+  <cs:downBar>
+    <cs:lnRef idx="0"/>
+    <cs:fillRef idx="0"/>
+    <cs:effectRef idx="0"/>
+    <cs:fontRef idx="minor">
+      <a:schemeClr val="dk1"/>
+    </cs:fontRef>
+    <cs:spPr>
+      <a:solidFill>
+        <a:schemeClr val="dk1">
+          <a:lumMod val="65000"/>
+          <a:lumOff val="35000"/>
+        </a:schemeClr>
+      </a:solidFill>
+      <a:ln w="9525">
+        <a:solidFill>
+          <a:schemeClr val="tx1">
+            <a:lumMod val="65000"/>
+            <a:lumOff val="35000"/>
+          </a:schemeClr>
+        </a:solidFill>
+      </a:ln>
+    </cs:spPr>
+  </cs:downBar>
+  <cs:dropLine>
+    <cs:lnRef idx="0"/>
+    <cs:fillRef idx="0"/>
+    <cs:effectRef idx="0"/>
+    <cs:fontRef idx="minor">
+      <a:schemeClr val="tx1"/>
+    </cs:fontRef>
+    <cs:spPr>
+      <a:ln w="9525" cap="flat" cmpd="sng" algn="ctr">
+        <a:solidFill>
+          <a:schemeClr val="tx1">
+            <a:lumMod val="35000"/>
+            <a:lumOff val="65000"/>
+          </a:schemeClr>
+        </a:solidFill>
+        <a:round/>
+      </a:ln>
+    </cs:spPr>
+  </cs:dropLine>
+  <cs:errorBar>
+    <cs:lnRef idx="0"/>
+    <cs:fillRef idx="0"/>
+    <cs:effectRef idx="0"/>
+    <cs:fontRef idx="minor">
+      <a:schemeClr val="tx1"/>
+    </cs:fontRef>
+    <cs:spPr>
+      <a:ln w="9525" cap="flat" cmpd="sng" algn="ctr">
+        <a:solidFill>
+          <a:schemeClr val="tx1">
+            <a:lumMod val="65000"/>
+            <a:lumOff val="35000"/>
+          </a:schemeClr>
+        </a:solidFill>
+        <a:round/>
+      </a:ln>
+    </cs:spPr>
+  </cs:errorBar>
+  <cs:floor>
+    <cs:lnRef idx="0"/>
+    <cs:fillRef idx="0"/>
+    <cs:effectRef idx="0"/>
+    <cs:fontRef idx="minor">
+      <a:schemeClr val="tx1"/>
+    </cs:fontRef>
+    <cs:spPr>
+      <a:noFill/>
+      <a:ln>
+        <a:noFill/>
+      </a:ln>
+    </cs:spPr>
+  </cs:floor>
+  <cs:gridlineMajor>
+    <cs:lnRef idx="0"/>
+    <cs:fillRef idx="0"/>
+    <cs:effectRef idx="0"/>
+    <cs:fontRef idx="minor">
+      <a:schemeClr val="tx1"/>
+    </cs:fontRef>
+    <cs:spPr>
+      <a:ln w="9525" cap="flat" cmpd="sng" algn="ctr">
+        <a:solidFill>
+          <a:schemeClr val="tx1">
+            <a:lumMod val="15000"/>
+            <a:lumOff val="85000"/>
+          </a:schemeClr>
+        </a:solidFill>
+        <a:round/>
+      </a:ln>
+    </cs:spPr>
+  </cs:gridlineMajor>
+  <cs:gridlineMinor>
+    <cs:lnRef idx="0"/>
+    <cs:fillRef idx="0"/>
+    <cs:effectRef idx="0"/>
+    <cs:fontRef idx="minor">
+      <a:schemeClr val="tx1"/>
+    </cs:fontRef>
+    <cs:spPr>
+      <a:ln w="9525" cap="flat" cmpd="sng" algn="ctr">
+        <a:solidFill>
+          <a:schemeClr val="tx1">
+            <a:lumMod val="5000"/>
+            <a:lumOff val="95000"/>
+          </a:schemeClr>
+        </a:solidFill>
+        <a:round/>
+      </a:ln>
+    </cs:spPr>
+  </cs:gridlineMinor>
+  <cs:hiLoLine>
+    <cs:lnRef idx="0"/>
+    <cs:fillRef idx="0"/>
+    <cs:effectRef idx="0"/>
+    <cs:fontRef idx="minor">
+      <a:schemeClr val="tx1"/>
+    </cs:fontRef>
+    <cs:spPr>
+      <a:ln w="9525" cap="flat" cmpd="sng" algn="ctr">
+        <a:solidFill>
+          <a:schemeClr val="tx1">
+            <a:lumMod val="75000"/>
+            <a:lumOff val="25000"/>
+          </a:schemeClr>
+        </a:solidFill>
+        <a:round/>
+      </a:ln>
+    </cs:spPr>
+  </cs:hiLoLine>
+  <cs:leaderLine>
+    <cs:lnRef idx="0"/>
+    <cs:fillRef idx="0"/>
+    <cs:effectRef idx="0"/>
+    <cs:fontRef idx="minor">
+      <a:schemeClr val="tx1"/>
+    </cs:fontRef>
+    <cs:spPr>
+      <a:ln w="9525" cap="flat" cmpd="sng" algn="ctr">
+        <a:solidFill>
+          <a:schemeClr val="tx1">
+            <a:lumMod val="35000"/>
+            <a:lumOff val="65000"/>
+          </a:schemeClr>
+        </a:solidFill>
+        <a:round/>
+      </a:ln>
+    </cs:spPr>
+  </cs:leaderLine>
+  <cs:legend>
+    <cs:lnRef idx="0"/>
+    <cs:fillRef idx="0"/>
+    <cs:effectRef idx="0"/>
+    <cs:fontRef idx="minor">
+      <a:schemeClr val="tx1">
+        <a:lumMod val="65000"/>
+        <a:lumOff val="35000"/>
+      </a:schemeClr>
+    </cs:fontRef>
+    <cs:defRPr sz="900" kern="1200"/>
+  </cs:legend>
+  <cs:plotArea mods="allowNoFillOverride allowNoLineOverride">
+    <cs:lnRef idx="0"/>
+    <cs:fillRef idx="0"/>
+    <cs:effectRef idx="0"/>
+    <cs:fontRef idx="minor">
+      <a:schemeClr val="tx1"/>
+    </cs:fontRef>
+  </cs:plotArea>
+  <cs:plotArea3D mods="allowNoFillOverride allowNoLineOverride">
+    <cs:lnRef idx="0"/>
+    <cs:fillRef idx="0"/>
+    <cs:effectRef idx="0"/>
+    <cs:fontRef idx="minor">
+      <a:schemeClr val="tx1"/>
+    </cs:fontRef>
+  </cs:plotArea3D>
+  <cs:seriesAxis>
+    <cs:lnRef idx="0"/>
+    <cs:fillRef idx="0"/>
+    <cs:effectRef idx="0"/>
+    <cs:fontRef idx="minor">
+      <a:schemeClr val="tx1">
+        <a:lumMod val="65000"/>
+        <a:lumOff val="35000"/>
+      </a:schemeClr>
+    </cs:fontRef>
+    <cs:defRPr sz="900" kern="1200"/>
+  </cs:seriesAxis>
+  <cs:seriesLine>
+    <cs:lnRef idx="0"/>
+    <cs:fillRef idx="0"/>
+    <cs:effectRef idx="0"/>
+    <cs:fontRef idx="minor">
+      <a:schemeClr val="tx1"/>
+    </cs:fontRef>
+    <cs:spPr>
+      <a:ln w="9525" cap="flat" cmpd="sng" algn="ctr">
+        <a:solidFill>
+          <a:schemeClr val="tx1">
+            <a:lumMod val="35000"/>
+            <a:lumOff val="65000"/>
+          </a:schemeClr>
+        </a:solidFill>
+        <a:round/>
+      </a:ln>
+    </cs:spPr>
+  </cs:seriesLine>
+  <cs:title>
+    <cs:lnRef idx="0"/>
+    <cs:fillRef idx="0"/>
+    <cs:effectRef idx="0"/>
+    <cs:fontRef idx="minor">
+      <a:schemeClr val="tx1">
+        <a:lumMod val="65000"/>
+        <a:lumOff val="35000"/>
+      </a:schemeClr>
+    </cs:fontRef>
+    <cs:defRPr sz="1400" b="0" kern="1200" spc="0" baseline="0"/>
+  </cs:title>
+  <cs:trendline>
+    <cs:lnRef idx="0">
+      <cs:styleClr val="auto"/>
+    </cs:lnRef>
+    <cs:fillRef idx="0"/>
+    <cs:effectRef idx="0"/>
+    <cs:fontRef idx="minor">
+      <a:schemeClr val="tx1"/>
+    </cs:fontRef>
+    <cs:spPr>
+      <a:ln w="19050" cap="rnd">
+        <a:solidFill>
+          <a:schemeClr val="phClr"/>
+        </a:solidFill>
+        <a:prstDash val="sysDot"/>
+      </a:ln>
+    </cs:spPr>
+  </cs:trendline>
+  <cs:trendlineLabel>
+    <cs:lnRef idx="0"/>
+    <cs:fillRef idx="0"/>
+    <cs:effectRef idx="0"/>
+    <cs:fontRef idx="minor">
+      <a:schemeClr val="tx1">
+        <a:lumMod val="65000"/>
+        <a:lumOff val="35000"/>
+      </a:schemeClr>
+    </cs:fontRef>
+    <cs:defRPr sz="900" kern="1200"/>
+  </cs:trendlineLabel>
+  <cs:upBar>
+    <cs:lnRef idx="0"/>
+    <cs:fillRef idx="0"/>
+    <cs:effectRef idx="0"/>
+    <cs:fontRef idx="minor">
+      <a:schemeClr val="dk1"/>
+    </cs:fontRef>
+    <cs:spPr>
+      <a:solidFill>
+        <a:schemeClr val="lt1"/>
+      </a:solidFill>
+      <a:ln w="9525">
+        <a:solidFill>
+          <a:schemeClr val="tx1">
+            <a:lumMod val="15000"/>
+            <a:lumOff val="85000"/>
+          </a:schemeClr>
+        </a:solidFill>
+      </a:ln>
+    </cs:spPr>
+  </cs:upBar>
+  <cs:valueAxis>
+    <cs:lnRef idx="0"/>
+    <cs:fillRef idx="0"/>
+    <cs:effectRef idx="0"/>
+    <cs:fontRef idx="minor">
+      <a:schemeClr val="tx1">
+        <a:lumMod val="65000"/>
+        <a:lumOff val="35000"/>
+      </a:schemeClr>
+    </cs:fontRef>
+    <cs:defRPr sz="900" kern="1200"/>
+  </cs:valueAxis>
+  <cs:wall>
+    <cs:lnRef idx="0"/>
+    <cs:fillRef idx="0"/>
+    <cs:effectRef idx="0"/>
+    <cs:fontRef idx="minor">
+      <a:schemeClr val="tx1"/>
+    </cs:fontRef>
+    <cs:spPr>
+      <a:noFill/>
+      <a:ln>
+        <a:noFill/>
+      </a:ln>
+    </cs:spPr>
+  </cs:wall>
+</cs:chartStyle>
 </file>
 
 <file path=ppt/slideLayouts/slideLayout1.xml><?xml version="1.0" encoding="utf-8"?>
@@ -265,7 +2162,7 @@
           <a:p>
             <a:fld id="{9BED4BE8-31C7-403D-911A-3E727E0E58BF}" type="datetimeFigureOut">
               <a:rPr lang="en-US" smtClean="0"/>
-              <a:t>3/9/2022</a:t>
+              <a:t>3/11/2022</a:t>
             </a:fld>
             <a:endParaRPr lang="en-US" dirty="0"/>
           </a:p>
@@ -463,7 +2360,7 @@
           <a:p>
             <a:fld id="{9BED4BE8-31C7-403D-911A-3E727E0E58BF}" type="datetimeFigureOut">
               <a:rPr lang="en-US" smtClean="0"/>
-              <a:t>3/9/2022</a:t>
+              <a:t>3/11/2022</a:t>
             </a:fld>
             <a:endParaRPr lang="en-US" dirty="0"/>
           </a:p>
@@ -671,7 +2568,7 @@
           <a:p>
             <a:fld id="{9BED4BE8-31C7-403D-911A-3E727E0E58BF}" type="datetimeFigureOut">
               <a:rPr lang="en-US" smtClean="0"/>
-              <a:t>3/9/2022</a:t>
+              <a:t>3/11/2022</a:t>
             </a:fld>
             <a:endParaRPr lang="en-US" dirty="0"/>
           </a:p>
@@ -869,7 +2766,7 @@
           <a:p>
             <a:fld id="{9BED4BE8-31C7-403D-911A-3E727E0E58BF}" type="datetimeFigureOut">
               <a:rPr lang="en-US" smtClean="0"/>
-              <a:t>3/9/2022</a:t>
+              <a:t>3/11/2022</a:t>
             </a:fld>
             <a:endParaRPr lang="en-US" dirty="0"/>
           </a:p>
@@ -1144,7 +3041,7 @@
           <a:p>
             <a:fld id="{9BED4BE8-31C7-403D-911A-3E727E0E58BF}" type="datetimeFigureOut">
               <a:rPr lang="en-US" smtClean="0"/>
-              <a:t>3/9/2022</a:t>
+              <a:t>3/11/2022</a:t>
             </a:fld>
             <a:endParaRPr lang="en-US" dirty="0"/>
           </a:p>
@@ -1409,7 +3306,7 @@
           <a:p>
             <a:fld id="{9BED4BE8-31C7-403D-911A-3E727E0E58BF}" type="datetimeFigureOut">
               <a:rPr lang="en-US" smtClean="0"/>
-              <a:t>3/9/2022</a:t>
+              <a:t>3/11/2022</a:t>
             </a:fld>
             <a:endParaRPr lang="en-US" dirty="0"/>
           </a:p>
@@ -1821,7 +3718,7 @@
           <a:p>
             <a:fld id="{9BED4BE8-31C7-403D-911A-3E727E0E58BF}" type="datetimeFigureOut">
               <a:rPr lang="en-US" smtClean="0"/>
-              <a:t>3/9/2022</a:t>
+              <a:t>3/11/2022</a:t>
             </a:fld>
             <a:endParaRPr lang="en-US" dirty="0"/>
           </a:p>
@@ -1962,7 +3859,7 @@
           <a:p>
             <a:fld id="{9BED4BE8-31C7-403D-911A-3E727E0E58BF}" type="datetimeFigureOut">
               <a:rPr lang="en-US" smtClean="0"/>
-              <a:t>3/9/2022</a:t>
+              <a:t>3/11/2022</a:t>
             </a:fld>
             <a:endParaRPr lang="en-US" dirty="0"/>
           </a:p>
@@ -2075,7 +3972,7 @@
           <a:p>
             <a:fld id="{9BED4BE8-31C7-403D-911A-3E727E0E58BF}" type="datetimeFigureOut">
               <a:rPr lang="en-US" smtClean="0"/>
-              <a:t>3/9/2022</a:t>
+              <a:t>3/11/2022</a:t>
             </a:fld>
             <a:endParaRPr lang="en-US" dirty="0"/>
           </a:p>
@@ -2386,7 +4283,7 @@
           <a:p>
             <a:fld id="{9BED4BE8-31C7-403D-911A-3E727E0E58BF}" type="datetimeFigureOut">
               <a:rPr lang="en-US" smtClean="0"/>
-              <a:t>3/9/2022</a:t>
+              <a:t>3/11/2022</a:t>
             </a:fld>
             <a:endParaRPr lang="en-US" dirty="0"/>
           </a:p>
@@ -2674,7 +4571,7 @@
           <a:p>
             <a:fld id="{9BED4BE8-31C7-403D-911A-3E727E0E58BF}" type="datetimeFigureOut">
               <a:rPr lang="en-US" smtClean="0"/>
-              <a:t>3/9/2022</a:t>
+              <a:t>3/11/2022</a:t>
             </a:fld>
             <a:endParaRPr lang="en-US" dirty="0"/>
           </a:p>
@@ -2915,7 +4812,7 @@
           <a:p>
             <a:fld id="{9BED4BE8-31C7-403D-911A-3E727E0E58BF}" type="datetimeFigureOut">
               <a:rPr lang="en-US" smtClean="0"/>
-              <a:t>3/9/2022</a:t>
+              <a:t>3/11/2022</a:t>
             </a:fld>
             <a:endParaRPr lang="en-US" dirty="0"/>
           </a:p>
@@ -28456,6 +30353,66 @@
 </p:sld>
 </file>
 
+<file path=ppt/slides/slide8.xml><?xml version="1.0" encoding="utf-8"?>
+<p:sld xmlns:a="http://schemas.openxmlformats.org/drawingml/2006/main" xmlns:r="http://schemas.openxmlformats.org/officeDocument/2006/relationships" xmlns:p="http://schemas.openxmlformats.org/presentationml/2006/main">
+  <p:cSld>
+    <p:spTree>
+      <p:nvGrpSpPr>
+        <p:cNvPr id="1" name=""/>
+        <p:cNvGrpSpPr/>
+        <p:nvPr/>
+      </p:nvGrpSpPr>
+      <p:grpSpPr>
+        <a:xfrm>
+          <a:off x="0" y="0"/>
+          <a:ext cx="0" cy="0"/>
+          <a:chOff x="0" y="0"/>
+          <a:chExt cx="0" cy="0"/>
+        </a:xfrm>
+      </p:grpSpPr>
+      <p:graphicFrame>
+        <p:nvGraphicFramePr>
+          <p:cNvPr id="4" name="Chart 3">
+            <a:extLst>
+              <a:ext uri="{FF2B5EF4-FFF2-40B4-BE49-F238E27FC236}">
+                <a16:creationId xmlns:a16="http://schemas.microsoft.com/office/drawing/2014/main" id="{4F8217CC-973D-453A-9A72-F2A365A957AB}"/>
+              </a:ext>
+            </a:extLst>
+          </p:cNvPr>
+          <p:cNvGraphicFramePr>
+            <a:graphicFrameLocks/>
+          </p:cNvGraphicFramePr>
+          <p:nvPr>
+            <p:extLst>
+              <p:ext uri="{D42A27DB-BD31-4B8C-83A1-F6EECF244321}">
+                <p14:modId xmlns:p14="http://schemas.microsoft.com/office/powerpoint/2010/main" val="2718211966"/>
+              </p:ext>
+            </p:extLst>
+          </p:nvPr>
+        </p:nvGraphicFramePr>
+        <p:xfrm>
+          <a:off x="2851485" y="1275348"/>
+          <a:ext cx="5527012" cy="3399648"/>
+        </p:xfrm>
+        <a:graphic>
+          <a:graphicData uri="http://schemas.openxmlformats.org/drawingml/2006/chart">
+            <c:chart xmlns:c="http://schemas.openxmlformats.org/drawingml/2006/chart" xmlns:r="http://schemas.openxmlformats.org/officeDocument/2006/relationships" r:id="rId2"/>
+          </a:graphicData>
+        </a:graphic>
+      </p:graphicFrame>
+    </p:spTree>
+    <p:extLst>
+      <p:ext uri="{BB962C8B-B14F-4D97-AF65-F5344CB8AC3E}">
+        <p14:creationId xmlns:p14="http://schemas.microsoft.com/office/powerpoint/2010/main" val="1161385954"/>
+      </p:ext>
+    </p:extLst>
+  </p:cSld>
+  <p:clrMapOvr>
+    <a:masterClrMapping/>
+  </p:clrMapOvr>
+</p:sld>
+</file>
+
 <file path=ppt/theme/theme1.xml><?xml version="1.0" encoding="utf-8"?>
 <a:theme xmlns:a="http://schemas.openxmlformats.org/drawingml/2006/main" name="Office Theme">
   <a:themeElements>

</xml_diff>